<commit_message>
Updated with User Manual
</commit_message>
<xml_diff>
--- a/CS415 Release 1 Presentation.pptx
+++ b/CS415 Release 1 Presentation.pptx
@@ -11,13 +11,16 @@
     <p:sldId id="259" r:id="rId5"/>
     <p:sldId id="268" r:id="rId6"/>
     <p:sldId id="260" r:id="rId7"/>
-    <p:sldId id="261" r:id="rId8"/>
+    <p:sldId id="270" r:id="rId8"/>
     <p:sldId id="262" r:id="rId9"/>
-    <p:sldId id="263" r:id="rId10"/>
-    <p:sldId id="269" r:id="rId11"/>
-    <p:sldId id="264" r:id="rId12"/>
-    <p:sldId id="265" r:id="rId13"/>
-    <p:sldId id="267" r:id="rId14"/>
+    <p:sldId id="261" r:id="rId10"/>
+    <p:sldId id="263" r:id="rId11"/>
+    <p:sldId id="269" r:id="rId12"/>
+    <p:sldId id="271" r:id="rId13"/>
+    <p:sldId id="264" r:id="rId14"/>
+    <p:sldId id="265" r:id="rId15"/>
+    <p:sldId id="272" r:id="rId16"/>
+    <p:sldId id="267" r:id="rId17"/>
   </p:sldIdLst>
   <p:sldSz cx="12192000" cy="6858000"/>
   <p:notesSz cx="6858000" cy="9144000"/>
@@ -357,7 +360,7 @@
             <a:fld id="{5586B75A-687E-405C-8A0B-8D00578BA2C3}" type="datetimeFigureOut">
               <a:rPr lang="en-US" dirty="0"/>
               <a:pPr/>
-              <a:t>4/20/2023</a:t>
+              <a:t>4/21/2023</a:t>
             </a:fld>
             <a:endParaRPr lang="en-US" dirty="0"/>
           </a:p>
@@ -527,7 +530,7 @@
             <a:fld id="{5586B75A-687E-405C-8A0B-8D00578BA2C3}" type="datetimeFigureOut">
               <a:rPr lang="en-US" dirty="0"/>
               <a:pPr/>
-              <a:t>4/20/2023</a:t>
+              <a:t>4/21/2023</a:t>
             </a:fld>
             <a:endParaRPr lang="en-US" dirty="0"/>
           </a:p>
@@ -707,7 +710,7 @@
             <a:fld id="{5586B75A-687E-405C-8A0B-8D00578BA2C3}" type="datetimeFigureOut">
               <a:rPr lang="en-US" dirty="0"/>
               <a:pPr/>
-              <a:t>4/20/2023</a:t>
+              <a:t>4/21/2023</a:t>
             </a:fld>
             <a:endParaRPr lang="en-US" dirty="0"/>
           </a:p>
@@ -877,7 +880,7 @@
             <a:fld id="{5586B75A-687E-405C-8A0B-8D00578BA2C3}" type="datetimeFigureOut">
               <a:rPr lang="en-US" dirty="0"/>
               <a:pPr/>
-              <a:t>4/20/2023</a:t>
+              <a:t>4/21/2023</a:t>
             </a:fld>
             <a:endParaRPr lang="en-US" dirty="0"/>
           </a:p>
@@ -1136,7 +1139,7 @@
             <a:fld id="{5586B75A-687E-405C-8A0B-8D00578BA2C3}" type="datetimeFigureOut">
               <a:rPr lang="en-US" dirty="0"/>
               <a:pPr/>
-              <a:t>4/20/2023</a:t>
+              <a:t>4/21/2023</a:t>
             </a:fld>
             <a:endParaRPr lang="en-US" dirty="0"/>
           </a:p>
@@ -1423,7 +1426,7 @@
             <a:fld id="{5586B75A-687E-405C-8A0B-8D00578BA2C3}" type="datetimeFigureOut">
               <a:rPr lang="en-US" dirty="0"/>
               <a:pPr/>
-              <a:t>4/20/2023</a:t>
+              <a:t>4/21/2023</a:t>
             </a:fld>
             <a:endParaRPr lang="en-US" dirty="0"/>
           </a:p>
@@ -1864,7 +1867,7 @@
             <a:fld id="{5586B75A-687E-405C-8A0B-8D00578BA2C3}" type="datetimeFigureOut">
               <a:rPr lang="en-US" dirty="0"/>
               <a:pPr/>
-              <a:t>4/20/2023</a:t>
+              <a:t>4/21/2023</a:t>
             </a:fld>
             <a:endParaRPr lang="en-US" dirty="0"/>
           </a:p>
@@ -1983,7 +1986,7 @@
             <a:fld id="{5586B75A-687E-405C-8A0B-8D00578BA2C3}" type="datetimeFigureOut">
               <a:rPr lang="en-US" dirty="0"/>
               <a:pPr/>
-              <a:t>4/20/2023</a:t>
+              <a:t>4/21/2023</a:t>
             </a:fld>
             <a:endParaRPr lang="en-US" dirty="0"/>
           </a:p>
@@ -2080,7 +2083,7 @@
             <a:fld id="{5586B75A-687E-405C-8A0B-8D00578BA2C3}" type="datetimeFigureOut">
               <a:rPr lang="en-US" dirty="0"/>
               <a:pPr/>
-              <a:t>4/20/2023</a:t>
+              <a:t>4/21/2023</a:t>
             </a:fld>
             <a:endParaRPr lang="en-US" dirty="0"/>
           </a:p>
@@ -2368,7 +2371,7 @@
             <a:fld id="{5586B75A-687E-405C-8A0B-8D00578BA2C3}" type="datetimeFigureOut">
               <a:rPr lang="en-US" dirty="0"/>
               <a:pPr/>
-              <a:t>4/20/2023</a:t>
+              <a:t>4/21/2023</a:t>
             </a:fld>
             <a:endParaRPr lang="en-US" dirty="0"/>
           </a:p>
@@ -2638,7 +2641,7 @@
             <a:fld id="{5586B75A-687E-405C-8A0B-8D00578BA2C3}" type="datetimeFigureOut">
               <a:rPr lang="en-US" dirty="0"/>
               <a:pPr/>
-              <a:t>4/20/2023</a:t>
+              <a:t>4/21/2023</a:t>
             </a:fld>
             <a:endParaRPr lang="en-US" dirty="0"/>
           </a:p>
@@ -2935,7 +2938,7 @@
             <a:fld id="{5586B75A-687E-405C-8A0B-8D00578BA2C3}" type="datetimeFigureOut">
               <a:rPr lang="en-US" dirty="0"/>
               <a:pPr/>
-              <a:t>4/20/2023</a:t>
+              <a:t>4/21/2023</a:t>
             </a:fld>
             <a:endParaRPr lang="en-US" dirty="0"/>
           </a:p>
@@ -3682,14 +3685,14 @@
           <p:nvPr>
             <p:extLst>
               <p:ext uri="{D42A27DB-BD31-4B8C-83A1-F6EECF244321}">
-                <p14:modId xmlns:p14="http://schemas.microsoft.com/office/powerpoint/2010/main" val="2576818115"/>
+                <p14:modId xmlns:p14="http://schemas.microsoft.com/office/powerpoint/2010/main" val="3865172170"/>
               </p:ext>
             </p:extLst>
           </p:nvPr>
         </p:nvGraphicFramePr>
         <p:xfrm>
           <a:off x="6586977" y="1744570"/>
-          <a:ext cx="4908849" cy="3360711"/>
+          <a:ext cx="4908849" cy="3656322"/>
         </p:xfrm>
         <a:graphic>
           <a:graphicData uri="http://schemas.openxmlformats.org/drawingml/2006/table">
@@ -3873,7 +3876,40 @@
                     <a:bodyPr/>
                     <a:lstStyle/>
                     <a:p>
-                      <a:endParaRPr lang="en-US" sz="2900" cap="none" spc="0">
+                      <a:pPr marL="0" marR="0" lvl="0" indent="0" algn="l" defTabSz="914400" rtl="0" eaLnBrk="1" fontAlgn="auto" latinLnBrk="0" hangingPunct="1">
+                        <a:lnSpc>
+                          <a:spcPct val="100000"/>
+                        </a:lnSpc>
+                        <a:spcBef>
+                          <a:spcPts val="0"/>
+                        </a:spcBef>
+                        <a:spcAft>
+                          <a:spcPts val="0"/>
+                        </a:spcAft>
+                        <a:buClrTx/>
+                        <a:buSzTx/>
+                        <a:buFontTx/>
+                        <a:buNone/>
+                        <a:tabLst/>
+                        <a:defRPr/>
+                      </a:pPr>
+                      <a:r>
+                        <a:rPr lang="en-US" sz="2900" cap="none" spc="0" dirty="0">
+                          <a:solidFill>
+                            <a:schemeClr val="bg1"/>
+                          </a:solidFill>
+                        </a:rPr>
+                        <a:t>Hinrich </a:t>
+                      </a:r>
+                      <a:r>
+                        <a:rPr lang="en-US" sz="2900" cap="none" spc="0" dirty="0" err="1">
+                          <a:solidFill>
+                            <a:schemeClr val="bg1"/>
+                          </a:solidFill>
+                        </a:rPr>
+                        <a:t>Muertigue</a:t>
+                      </a:r>
+                      <a:endParaRPr lang="en-US" sz="2900" cap="none" spc="0" dirty="0">
                         <a:solidFill>
                           <a:schemeClr val="bg1"/>
                         </a:solidFill>
@@ -3909,7 +3945,15 @@
                     <a:bodyPr/>
                     <a:lstStyle/>
                     <a:p>
-                      <a:endParaRPr lang="en-US" sz="2900" cap="none" spc="0">
+                      <a:r>
+                        <a:rPr lang="en-US" sz="2900" cap="none" spc="0">
+                          <a:solidFill>
+                            <a:schemeClr val="bg1"/>
+                          </a:solidFill>
+                        </a:rPr>
+                        <a:t>S11184309</a:t>
+                      </a:r>
+                      <a:endParaRPr lang="en-US" sz="2900" cap="none" spc="0" dirty="0">
                         <a:solidFill>
                           <a:schemeClr val="bg1"/>
                         </a:solidFill>
@@ -4237,35 +4281,28 @@
                 <a:ea typeface="+mn-lt"/>
                 <a:cs typeface="+mn-lt"/>
               </a:rPr>
-              <a:t>Improved decision-making using comprehensive reporting capabilities, </a:t>
-            </a:r>
-            <a:endParaRPr lang="en-US" sz="2800" dirty="0"/>
-          </a:p>
-          <a:p>
+              <a:t>Implementing the Wheel Wise Insurance Management System offers clients numerous benefit:</a:t>
+            </a:r>
+            <a:endParaRPr lang="en-US" sz="2800"/>
+          </a:p>
+          <a:p>
+            <a:pPr lvl="1" indent="0"/>
             <a:r>
               <a:rPr lang="en-US" sz="2800" dirty="0">
                 <a:ea typeface="+mn-lt"/>
                 <a:cs typeface="+mn-lt"/>
               </a:rPr>
-              <a:t>Reduced operational costs due to automation, and </a:t>
-            </a:r>
-          </a:p>
-          <a:p>
+              <a:t>Including increased efficiency through streamlined processes, </a:t>
+            </a:r>
+          </a:p>
+          <a:p>
+            <a:pPr lvl="1" indent="0"/>
             <a:r>
               <a:rPr lang="en-US" sz="2800" dirty="0">
                 <a:ea typeface="+mn-lt"/>
                 <a:cs typeface="+mn-lt"/>
               </a:rPr>
-              <a:t>Regulatory compliance by incorporating necessary security measures. </a:t>
-            </a:r>
-          </a:p>
-          <a:p>
-            <a:r>
-              <a:rPr lang="en-US" sz="2800" dirty="0">
-                <a:ea typeface="+mn-lt"/>
-                <a:cs typeface="+mn-lt"/>
-              </a:rPr>
-              <a:t>These benefits contribute to a more competitive and successful insurance business in the long run.</a:t>
+              <a:t>Enhanced customer satisfaction with seamless user experience, </a:t>
             </a:r>
             <a:endParaRPr lang="en-US" sz="2800"/>
           </a:p>
@@ -4364,7 +4401,7 @@
     </p:spTree>
     <p:extLst>
       <p:ext uri="{BB962C8B-B14F-4D97-AF65-F5344CB8AC3E}">
-        <p14:creationId xmlns:p14="http://schemas.microsoft.com/office/powerpoint/2010/main" val="3288012390"/>
+        <p14:creationId xmlns:p14="http://schemas.microsoft.com/office/powerpoint/2010/main" val="2554246962"/>
       </p:ext>
     </p:extLst>
   </p:cSld>
@@ -4577,7 +4614,7 @@
           <p:cNvPr id="2" name="Title 1">
             <a:extLst>
               <a:ext uri="{FF2B5EF4-FFF2-40B4-BE49-F238E27FC236}">
-                <a16:creationId xmlns:a16="http://schemas.microsoft.com/office/drawing/2014/main" id="{B2E3FF81-8F15-CA4B-33B8-7AC2EEC23320}"/>
+                <a16:creationId xmlns:a16="http://schemas.microsoft.com/office/drawing/2014/main" id="{96E2743E-97B5-54DB-AC50-DE4F7B6B5F01}"/>
               </a:ext>
             </a:extLst>
           </p:cNvPr>
@@ -4605,8 +4642,14 @@
                 <a:latin typeface="Arial"/>
                 <a:cs typeface="Arial"/>
               </a:rPr>
-              <a:t>Demo</a:t>
-            </a:r>
+              <a:t> Projected Benefits</a:t>
+            </a:r>
+            <a:endParaRPr lang="en-US" dirty="0"/>
+          </a:p>
+          <a:p>
+            <a:br>
+              <a:rPr lang="en-US" dirty="0"/>
+            </a:br>
             <a:endParaRPr lang="en-US" dirty="0"/>
           </a:p>
         </p:txBody>
@@ -4616,7 +4659,7 @@
           <p:cNvPr id="3" name="Content Placeholder 2">
             <a:extLst>
               <a:ext uri="{FF2B5EF4-FFF2-40B4-BE49-F238E27FC236}">
-                <a16:creationId xmlns:a16="http://schemas.microsoft.com/office/drawing/2014/main" id="{6AE15947-8FDF-BE93-F3E8-F79B6D759AEC}"/>
+                <a16:creationId xmlns:a16="http://schemas.microsoft.com/office/drawing/2014/main" id="{FE289D20-E233-DFCF-5E5B-05F88CC0AE53}"/>
               </a:ext>
             </a:extLst>
           </p:cNvPr>
@@ -4629,8 +4672,8 @@
         </p:nvSpPr>
         <p:spPr>
           <a:xfrm>
-            <a:off x="4209206" y="975572"/>
-            <a:ext cx="7041034" cy="4830655"/>
+            <a:off x="4252749" y="355086"/>
+            <a:ext cx="6801548" cy="6213141"/>
           </a:xfrm>
         </p:spPr>
         <p:txBody>
@@ -4639,31 +4682,42 @@
           </a:bodyPr>
           <a:lstStyle/>
           <a:p>
-            <a:pPr marL="0" indent="0" algn="ctr">
-              <a:buNone/>
-            </a:pPr>
-            <a:r>
-              <a:rPr lang="en-US" sz="5400" dirty="0">
-                <a:latin typeface="Times New Roman"/>
+            <a:r>
+              <a:rPr lang="en-US" sz="2800" dirty="0">
                 <a:ea typeface="+mn-lt"/>
                 <a:cs typeface="+mn-lt"/>
-                <a:hlinkClick r:id="rId2"/>
               </a:rPr>
-              <a:t>Demo</a:t>
-            </a:r>
-            <a:endParaRPr lang="en-US" sz="5400" dirty="0">
-              <a:latin typeface="Times New Roman"/>
-              <a:cs typeface="Arial"/>
-            </a:endParaRPr>
-          </a:p>
-          <a:p>
-            <a:pPr marL="0" indent="0">
-              <a:buNone/>
-            </a:pPr>
-            <a:br>
-              <a:rPr lang="en-US" dirty="0"/>
-            </a:br>
-            <a:endParaRPr lang="en-US" dirty="0"/>
+              <a:t>Improved decision-making using comprehensive reporting capabilities, </a:t>
+            </a:r>
+            <a:endParaRPr lang="en-US" sz="2800" dirty="0"/>
+          </a:p>
+          <a:p>
+            <a:r>
+              <a:rPr lang="en-US" sz="2800" dirty="0">
+                <a:ea typeface="+mn-lt"/>
+                <a:cs typeface="+mn-lt"/>
+              </a:rPr>
+              <a:t>Reduced operational costs due to automation, and </a:t>
+            </a:r>
+          </a:p>
+          <a:p>
+            <a:r>
+              <a:rPr lang="en-US" sz="2800" dirty="0">
+                <a:ea typeface="+mn-lt"/>
+                <a:cs typeface="+mn-lt"/>
+              </a:rPr>
+              <a:t>Regulatory compliance by incorporating necessary security measures. </a:t>
+            </a:r>
+          </a:p>
+          <a:p>
+            <a:r>
+              <a:rPr lang="en-US" sz="2800" dirty="0">
+                <a:ea typeface="+mn-lt"/>
+                <a:cs typeface="+mn-lt"/>
+              </a:rPr>
+              <a:t>These benefits contribute to a more competitive and successful insurance business in the long run.</a:t>
+            </a:r>
+            <a:endParaRPr lang="en-US" sz="2800"/>
           </a:p>
         </p:txBody>
       </p:sp>
@@ -4757,46 +4811,10 @@
           </a:fontRef>
         </p:style>
       </p:sp>
-      <p:sp>
-        <p:nvSpPr>
-          <p:cNvPr id="4" name="TextBox 3">
-            <a:extLst>
-              <a:ext uri="{FF2B5EF4-FFF2-40B4-BE49-F238E27FC236}">
-                <a16:creationId xmlns:a16="http://schemas.microsoft.com/office/drawing/2014/main" id="{3C481653-19E9-C535-FF7E-4B9085DC65A5}"/>
-              </a:ext>
-            </a:extLst>
-          </p:cNvPr>
-          <p:cNvSpPr txBox="1"/>
-          <p:nvPr/>
-        </p:nvSpPr>
-        <p:spPr>
-          <a:xfrm>
-            <a:off x="4898571" y="3222171"/>
-            <a:ext cx="2743200" cy="457200"/>
-          </a:xfrm>
-          <a:prstGeom prst="rect">
-            <a:avLst/>
-          </a:prstGeom>
-          <a:noFill/>
-        </p:spPr>
-        <p:txBody>
-          <a:bodyPr rot="0" spcFirstLastPara="0" vertOverflow="overflow" horzOverflow="overflow" vert="horz" wrap="square" lIns="91440" tIns="45720" rIns="91440" bIns="45720" numCol="1" spcCol="0" rtlCol="0" fromWordArt="0" anchor="t" anchorCtr="0" forceAA="0" compatLnSpc="1">
-            <a:prstTxWarp prst="textNoShape">
-              <a:avLst/>
-            </a:prstTxWarp>
-            <a:spAutoFit/>
-          </a:bodyPr>
-          <a:lstStyle/>
-          <a:p>
-            <a:pPr algn="l"/>
-            <a:endParaRPr lang="en-US"/>
-          </a:p>
-        </p:txBody>
-      </p:sp>
     </p:spTree>
     <p:extLst>
       <p:ext uri="{BB962C8B-B14F-4D97-AF65-F5344CB8AC3E}">
-        <p14:creationId xmlns:p14="http://schemas.microsoft.com/office/powerpoint/2010/main" val="3009311424"/>
+        <p14:creationId xmlns:p14="http://schemas.microsoft.com/office/powerpoint/2010/main" val="3288012390"/>
       </p:ext>
     </p:extLst>
   </p:cSld>
@@ -5009,7 +5027,7 @@
           <p:cNvPr id="2" name="Title 1">
             <a:extLst>
               <a:ext uri="{FF2B5EF4-FFF2-40B4-BE49-F238E27FC236}">
-                <a16:creationId xmlns:a16="http://schemas.microsoft.com/office/drawing/2014/main" id="{E375277E-7BB5-7D0C-BEE7-5324E35BD96D}"/>
+                <a16:creationId xmlns:a16="http://schemas.microsoft.com/office/drawing/2014/main" id="{96E2743E-97B5-54DB-AC50-DE4F7B6B5F01}"/>
               </a:ext>
             </a:extLst>
           </p:cNvPr>
@@ -5033,12 +5051,18 @@
           <a:lstStyle/>
           <a:p>
             <a:r>
-              <a:rPr lang="en-US">
+              <a:rPr lang="en-US" dirty="0">
                 <a:latin typeface="Arial"/>
                 <a:cs typeface="Arial"/>
               </a:rPr>
-              <a:t>Conclusion</a:t>
-            </a:r>
+              <a:t> Handling Change Request</a:t>
+            </a:r>
+            <a:endParaRPr lang="en-US" dirty="0"/>
+          </a:p>
+          <a:p>
+            <a:br>
+              <a:rPr lang="en-US" dirty="0"/>
+            </a:br>
             <a:endParaRPr lang="en-US" dirty="0"/>
           </a:p>
         </p:txBody>
@@ -5048,7 +5072,7 @@
           <p:cNvPr id="3" name="Content Placeholder 2">
             <a:extLst>
               <a:ext uri="{FF2B5EF4-FFF2-40B4-BE49-F238E27FC236}">
-                <a16:creationId xmlns:a16="http://schemas.microsoft.com/office/drawing/2014/main" id="{9E42F045-48E9-C929-8E87-20218771B32A}"/>
+                <a16:creationId xmlns:a16="http://schemas.microsoft.com/office/drawing/2014/main" id="{FE289D20-E233-DFCF-5E5B-05F88CC0AE53}"/>
               </a:ext>
             </a:extLst>
           </p:cNvPr>
@@ -5061,8 +5085,8 @@
         </p:nvSpPr>
         <p:spPr>
           <a:xfrm>
-            <a:off x="3882636" y="649000"/>
-            <a:ext cx="7824803" cy="6049855"/>
+            <a:off x="4252749" y="355086"/>
+            <a:ext cx="6801548" cy="6213141"/>
           </a:xfrm>
         </p:spPr>
         <p:txBody>
@@ -5071,36 +5095,148 @@
           </a:bodyPr>
           <a:lstStyle/>
           <a:p>
-            <a:r>
-              <a:rPr lang="en-US" sz="2400" dirty="0">
-                <a:latin typeface="Arial"/>
-                <a:cs typeface="Arial"/>
+            <a:pPr marL="0" indent="0">
+              <a:buNone/>
+            </a:pPr>
+            <a:r>
+              <a:rPr lang="en-US" sz="3600" b="1" u="sng" dirty="0">
+                <a:ea typeface="+mn-lt"/>
+                <a:cs typeface="+mn-lt"/>
               </a:rPr>
-              <a:t>In summary, the Wheel Wise Insurance Management System offers an all-inclusive solution for the client's insurance business, focusing on policy, claim, customer, premium, and reporting management. The system streamlines processes, enhances user experience, and improves decision-making. With robust security measures and external integrations, it ensures regulatory compliance and lowers operational costs. </a:t>
-            </a:r>
-            <a:endParaRPr lang="en-US" sz="2400" dirty="0">
-              <a:latin typeface="Corbel" panose="020B0503020204020204"/>
-              <a:cs typeface="Calibri" panose="020F0502020204030204"/>
+              <a:t>Change Request Process</a:t>
+            </a:r>
+          </a:p>
+          <a:p>
+            <a:pPr marL="514350" indent="-514350">
+              <a:buFont typeface="+mj-lt"/>
+              <a:buAutoNum type="arabicPeriod"/>
+            </a:pPr>
+            <a:r>
+              <a:rPr lang="en-US" sz="2800" dirty="0">
+                <a:effectLst/>
+                <a:latin typeface="Times New Roman" panose="02020603050405020304" pitchFamily="18" charset="0"/>
+                <a:ea typeface="Times New Roman" panose="02020603050405020304" pitchFamily="18" charset="0"/>
+              </a:rPr>
+              <a:t>Request submission</a:t>
+            </a:r>
+            <a:endParaRPr lang="en-US" sz="2800" b="1" u="sng" dirty="0">
+              <a:effectLst/>
+              <a:latin typeface="Times New Roman" panose="02020603050405020304" pitchFamily="18" charset="0"/>
+              <a:ea typeface="+mn-lt"/>
+              <a:cs typeface="+mn-lt"/>
             </a:endParaRPr>
           </a:p>
           <a:p>
-            <a:r>
-              <a:rPr lang="en-US" sz="2400" dirty="0">
-                <a:latin typeface="Arial"/>
-                <a:cs typeface="Arial"/>
+            <a:pPr marL="514350" indent="-514350">
+              <a:buFont typeface="+mj-lt"/>
+              <a:buAutoNum type="arabicPeriod"/>
+            </a:pPr>
+            <a:r>
+              <a:rPr lang="en-US" sz="2800" dirty="0">
+                <a:effectLst/>
+                <a:latin typeface="Times New Roman" panose="02020603050405020304" pitchFamily="18" charset="0"/>
+                <a:ea typeface="Times New Roman" panose="02020603050405020304" pitchFamily="18" charset="0"/>
               </a:rPr>
-              <a:t>Overall, the Wheel Wise Insurance Management System brings substantial value to the client's business, promoting growth and success in the competitive insurance industry.</a:t>
-            </a:r>
-            <a:endParaRPr lang="en-US" sz="2400">
-              <a:cs typeface="Calibri" panose="020F0502020204030204"/>
+              <a:t>Change request review</a:t>
+            </a:r>
+            <a:endParaRPr lang="en-US" sz="2800" b="1" u="sng" dirty="0">
+              <a:latin typeface="Times New Roman" panose="02020603050405020304" pitchFamily="18" charset="0"/>
+              <a:ea typeface="+mn-lt"/>
+              <a:cs typeface="+mn-lt"/>
             </a:endParaRPr>
           </a:p>
           <a:p>
-            <a:pPr algn="just"/>
-            <a:br>
-              <a:rPr lang="en-US" dirty="0"/>
-            </a:br>
-            <a:endParaRPr lang="en-US" dirty="0"/>
+            <a:pPr marL="514350" indent="-514350">
+              <a:buFont typeface="+mj-lt"/>
+              <a:buAutoNum type="arabicPeriod"/>
+            </a:pPr>
+            <a:r>
+              <a:rPr lang="en-US" sz="2800" dirty="0">
+                <a:effectLst/>
+                <a:latin typeface="Times New Roman" panose="02020603050405020304" pitchFamily="18" charset="0"/>
+                <a:ea typeface="Times New Roman" panose="02020603050405020304" pitchFamily="18" charset="0"/>
+              </a:rPr>
+              <a:t>Change request approval</a:t>
+            </a:r>
+            <a:endParaRPr lang="en-US" sz="2800" b="1" u="sng" dirty="0">
+              <a:effectLst/>
+              <a:latin typeface="Times New Roman" panose="02020603050405020304" pitchFamily="18" charset="0"/>
+              <a:ea typeface="+mn-lt"/>
+              <a:cs typeface="+mn-lt"/>
+            </a:endParaRPr>
+          </a:p>
+          <a:p>
+            <a:pPr marL="514350" indent="-514350">
+              <a:buFont typeface="+mj-lt"/>
+              <a:buAutoNum type="arabicPeriod"/>
+            </a:pPr>
+            <a:r>
+              <a:rPr lang="en-US" sz="2800" dirty="0">
+                <a:effectLst/>
+                <a:latin typeface="Times New Roman" panose="02020603050405020304" pitchFamily="18" charset="0"/>
+                <a:ea typeface="Times New Roman" panose="02020603050405020304" pitchFamily="18" charset="0"/>
+              </a:rPr>
+              <a:t>Change implementation planning</a:t>
+            </a:r>
+            <a:endParaRPr lang="en-US" sz="2800" b="1" u="sng" dirty="0">
+              <a:latin typeface="Times New Roman" panose="02020603050405020304" pitchFamily="18" charset="0"/>
+              <a:ea typeface="+mn-lt"/>
+              <a:cs typeface="+mn-lt"/>
+            </a:endParaRPr>
+          </a:p>
+          <a:p>
+            <a:pPr marL="514350" indent="-514350">
+              <a:buFont typeface="+mj-lt"/>
+              <a:buAutoNum type="arabicPeriod"/>
+            </a:pPr>
+            <a:r>
+              <a:rPr lang="en-US" sz="2800" dirty="0">
+                <a:effectLst/>
+                <a:latin typeface="Times New Roman" panose="02020603050405020304" pitchFamily="18" charset="0"/>
+                <a:ea typeface="Times New Roman" panose="02020603050405020304" pitchFamily="18" charset="0"/>
+              </a:rPr>
+              <a:t>Change implementation</a:t>
+            </a:r>
+            <a:endParaRPr lang="en-US" sz="2800" b="1" u="sng" dirty="0">
+              <a:effectLst/>
+              <a:latin typeface="Times New Roman" panose="02020603050405020304" pitchFamily="18" charset="0"/>
+              <a:ea typeface="+mn-lt"/>
+              <a:cs typeface="+mn-lt"/>
+            </a:endParaRPr>
+          </a:p>
+          <a:p>
+            <a:pPr marL="514350" indent="-514350">
+              <a:buFont typeface="+mj-lt"/>
+              <a:buAutoNum type="arabicPeriod"/>
+            </a:pPr>
+            <a:r>
+              <a:rPr lang="en-US" sz="2800" dirty="0">
+                <a:effectLst/>
+                <a:latin typeface="Times New Roman" panose="02020603050405020304" pitchFamily="18" charset="0"/>
+                <a:ea typeface="Times New Roman" panose="02020603050405020304" pitchFamily="18" charset="0"/>
+              </a:rPr>
+              <a:t>Change review and evaluation</a:t>
+            </a:r>
+            <a:endParaRPr lang="en-US" sz="2800" b="1" u="sng" dirty="0">
+              <a:latin typeface="Times New Roman" panose="02020603050405020304" pitchFamily="18" charset="0"/>
+              <a:ea typeface="+mn-lt"/>
+              <a:cs typeface="+mn-lt"/>
+            </a:endParaRPr>
+          </a:p>
+          <a:p>
+            <a:pPr marL="514350" indent="-514350">
+              <a:buFont typeface="+mj-lt"/>
+              <a:buAutoNum type="arabicPeriod"/>
+            </a:pPr>
+            <a:r>
+              <a:rPr lang="en-US" sz="2800" dirty="0">
+                <a:effectLst/>
+                <a:latin typeface="Times New Roman" panose="02020603050405020304" pitchFamily="18" charset="0"/>
+                <a:ea typeface="Times New Roman" panose="02020603050405020304" pitchFamily="18" charset="0"/>
+              </a:rPr>
+              <a:t>Change closure</a:t>
+            </a:r>
+            <a:endParaRPr lang="en-US" sz="2800" b="1" u="sng" dirty="0"/>
           </a:p>
         </p:txBody>
       </p:sp>
@@ -5197,6 +5333,841 @@
     </p:spTree>
     <p:extLst>
       <p:ext uri="{BB962C8B-B14F-4D97-AF65-F5344CB8AC3E}">
+        <p14:creationId xmlns:p14="http://schemas.microsoft.com/office/powerpoint/2010/main" val="2063210194"/>
+      </p:ext>
+    </p:extLst>
+  </p:cSld>
+  <p:clrMapOvr>
+    <a:overrideClrMapping bg1="dk1" tx1="lt1" bg2="dk2" tx2="lt2" accent1="accent1" accent2="accent2" accent3="accent3" accent4="accent4" accent5="accent5" accent6="accent6" hlink="hlink" folHlink="folHlink"/>
+  </p:clrMapOvr>
+  <mc:AlternateContent xmlns:mc="http://schemas.openxmlformats.org/markup-compatibility/2006" xmlns:p159="http://schemas.microsoft.com/office/powerpoint/2015/09/main">
+    <mc:Choice Requires="p159">
+      <p:transition spd="slow">
+        <p159:morph option="byObject"/>
+      </p:transition>
+    </mc:Choice>
+    <mc:Fallback xmlns="">
+      <p:transition spd="slow">
+        <p:fade/>
+      </p:transition>
+    </mc:Fallback>
+  </mc:AlternateContent>
+</p:sld>
+</file>
+
+<file path=ppt/slides/slide13.xml><?xml version="1.0" encoding="utf-8"?>
+<p:sld xmlns:a="http://schemas.openxmlformats.org/drawingml/2006/main" xmlns:r="http://schemas.openxmlformats.org/officeDocument/2006/relationships" xmlns:p="http://schemas.openxmlformats.org/presentationml/2006/main">
+  <p:cSld>
+    <p:bg>
+      <p:bgPr>
+        <a:solidFill>
+          <a:schemeClr val="bg1">
+            <a:tint val="95000"/>
+            <a:satMod val="170000"/>
+          </a:schemeClr>
+        </a:solidFill>
+        <a:effectLst/>
+      </p:bgPr>
+    </p:bg>
+    <p:spTree>
+      <p:nvGrpSpPr>
+        <p:cNvPr id="1" name=""/>
+        <p:cNvGrpSpPr/>
+        <p:nvPr/>
+      </p:nvGrpSpPr>
+      <p:grpSpPr>
+        <a:xfrm>
+          <a:off x="0" y="0"/>
+          <a:ext cx="0" cy="0"/>
+          <a:chOff x="0" y="0"/>
+          <a:chExt cx="0" cy="0"/>
+        </a:xfrm>
+      </p:grpSpPr>
+      <p:sp useBgFill="1">
+        <p:nvSpPr>
+          <p:cNvPr id="8" name="Rectangle 7">
+            <a:extLst>
+              <a:ext uri="{FF2B5EF4-FFF2-40B4-BE49-F238E27FC236}">
+                <a16:creationId xmlns:a16="http://schemas.microsoft.com/office/drawing/2014/main" id="{5DB23C2B-2054-4D8B-9E98-9190F8E05EAD}"/>
+              </a:ext>
+              <a:ext uri="{C183D7F6-B498-43B3-948B-1728B52AA6E4}">
+                <adec:decorative xmlns:adec="http://schemas.microsoft.com/office/drawing/2017/decorative" val="1"/>
+              </a:ext>
+            </a:extLst>
+          </p:cNvPr>
+          <p:cNvSpPr>
+            <a:spLocks noGrp="1" noRot="1" noChangeAspect="1" noMove="1" noResize="1" noEditPoints="1" noAdjustHandles="1" noChangeArrowheads="1" noChangeShapeType="1" noTextEdit="1"/>
+          </p:cNvSpPr>
+          <p:nvPr>
+            <p:extLst>
+              <p:ext uri="{386F3935-93C4-4BCD-93E2-E3B085C9AB24}">
+                <p16:designElem xmlns:p16="http://schemas.microsoft.com/office/powerpoint/2015/main" val="1"/>
+              </p:ext>
+            </p:extLst>
+          </p:nvPr>
+        </p:nvSpPr>
+        <p:spPr>
+          <a:xfrm>
+            <a:off x="0" y="0"/>
+            <a:ext cx="12192000" cy="6858000"/>
+          </a:xfrm>
+          <a:prstGeom prst="rect">
+            <a:avLst/>
+          </a:prstGeom>
+          <a:ln>
+            <a:noFill/>
+          </a:ln>
+        </p:spPr>
+        <p:style>
+          <a:lnRef idx="2">
+            <a:schemeClr val="accent1">
+              <a:shade val="50000"/>
+            </a:schemeClr>
+          </a:lnRef>
+          <a:fillRef idx="1">
+            <a:schemeClr val="accent1"/>
+          </a:fillRef>
+          <a:effectRef idx="0">
+            <a:schemeClr val="accent1"/>
+          </a:effectRef>
+          <a:fontRef idx="minor">
+            <a:schemeClr val="lt1"/>
+          </a:fontRef>
+        </p:style>
+        <p:txBody>
+          <a:bodyPr rtlCol="0" anchor="ctr"/>
+          <a:lstStyle/>
+          <a:p>
+            <a:pPr algn="ctr"/>
+            <a:endParaRPr lang="en-US"/>
+          </a:p>
+        </p:txBody>
+      </p:sp>
+      <p:sp>
+        <p:nvSpPr>
+          <p:cNvPr id="10" name="Freeform: Shape 9">
+            <a:extLst>
+              <a:ext uri="{FF2B5EF4-FFF2-40B4-BE49-F238E27FC236}">
+                <a16:creationId xmlns:a16="http://schemas.microsoft.com/office/drawing/2014/main" id="{8797B5BC-9873-45F9-97D6-298FB5AF08FF}"/>
+              </a:ext>
+              <a:ext uri="{C183D7F6-B498-43B3-948B-1728B52AA6E4}">
+                <adec:decorative xmlns:adec="http://schemas.microsoft.com/office/drawing/2017/decorative" val="1"/>
+              </a:ext>
+            </a:extLst>
+          </p:cNvPr>
+          <p:cNvSpPr>
+            <a:spLocks noGrp="1" noRot="1" noChangeAspect="1" noMove="1" noResize="1" noEditPoints="1" noAdjustHandles="1" noChangeArrowheads="1" noChangeShapeType="1" noTextEdit="1"/>
+          </p:cNvSpPr>
+          <p:nvPr>
+            <p:extLst>
+              <p:ext uri="{386F3935-93C4-4BCD-93E2-E3B085C9AB24}">
+                <p16:designElem xmlns:p16="http://schemas.microsoft.com/office/powerpoint/2015/main" val="1"/>
+              </p:ext>
+            </p:extLst>
+          </p:nvPr>
+        </p:nvSpPr>
+        <p:spPr>
+          <a:xfrm flipH="1" flipV="1">
+            <a:off x="0" y="762000"/>
+            <a:ext cx="4208489" cy="5334001"/>
+          </a:xfrm>
+          <a:custGeom>
+            <a:avLst/>
+            <a:gdLst>
+              <a:gd name="connsiteX0" fmla="*/ 1015642 w 4208489"/>
+              <a:gd name="connsiteY0" fmla="*/ 0 h 5334001"/>
+              <a:gd name="connsiteX1" fmla="*/ 4208489 w 4208489"/>
+              <a:gd name="connsiteY1" fmla="*/ 0 h 5334001"/>
+              <a:gd name="connsiteX2" fmla="*/ 4208489 w 4208489"/>
+              <a:gd name="connsiteY2" fmla="*/ 5334001 h 5334001"/>
+              <a:gd name="connsiteX3" fmla="*/ 0 w 4208489"/>
+              <a:gd name="connsiteY3" fmla="*/ 5334001 h 5334001"/>
+            </a:gdLst>
+            <a:ahLst/>
+            <a:cxnLst>
+              <a:cxn ang="0">
+                <a:pos x="connsiteX0" y="connsiteY0"/>
+              </a:cxn>
+              <a:cxn ang="0">
+                <a:pos x="connsiteX1" y="connsiteY1"/>
+              </a:cxn>
+              <a:cxn ang="0">
+                <a:pos x="connsiteX2" y="connsiteY2"/>
+              </a:cxn>
+              <a:cxn ang="0">
+                <a:pos x="connsiteX3" y="connsiteY3"/>
+              </a:cxn>
+            </a:cxnLst>
+            <a:rect l="l" t="t" r="r" b="b"/>
+            <a:pathLst>
+              <a:path w="4208489" h="5334001">
+                <a:moveTo>
+                  <a:pt x="1015642" y="0"/>
+                </a:moveTo>
+                <a:lnTo>
+                  <a:pt x="4208489" y="0"/>
+                </a:lnTo>
+                <a:lnTo>
+                  <a:pt x="4208489" y="5334001"/>
+                </a:lnTo>
+                <a:lnTo>
+                  <a:pt x="0" y="5334001"/>
+                </a:lnTo>
+                <a:close/>
+              </a:path>
+            </a:pathLst>
+          </a:custGeom>
+          <a:solidFill>
+            <a:schemeClr val="accent1"/>
+          </a:solidFill>
+          <a:ln>
+            <a:noFill/>
+          </a:ln>
+        </p:spPr>
+        <p:style>
+          <a:lnRef idx="2">
+            <a:schemeClr val="accent1">
+              <a:shade val="50000"/>
+            </a:schemeClr>
+          </a:lnRef>
+          <a:fillRef idx="1">
+            <a:schemeClr val="accent1"/>
+          </a:fillRef>
+          <a:effectRef idx="0">
+            <a:schemeClr val="accent1"/>
+          </a:effectRef>
+          <a:fontRef idx="minor">
+            <a:schemeClr val="lt1"/>
+          </a:fontRef>
+        </p:style>
+      </p:sp>
+      <p:sp>
+        <p:nvSpPr>
+          <p:cNvPr id="2" name="Title 1">
+            <a:extLst>
+              <a:ext uri="{FF2B5EF4-FFF2-40B4-BE49-F238E27FC236}">
+                <a16:creationId xmlns:a16="http://schemas.microsoft.com/office/drawing/2014/main" id="{B2E3FF81-8F15-CA4B-33B8-7AC2EEC23320}"/>
+              </a:ext>
+            </a:extLst>
+          </p:cNvPr>
+          <p:cNvSpPr>
+            <a:spLocks noGrp="1"/>
+          </p:cNvSpPr>
+          <p:nvPr>
+            <p:ph type="title"/>
+          </p:nvPr>
+        </p:nvSpPr>
+        <p:spPr>
+          <a:xfrm>
+            <a:off x="494260" y="1683144"/>
+            <a:ext cx="2774922" cy="3491712"/>
+          </a:xfrm>
+        </p:spPr>
+        <p:txBody>
+          <a:bodyPr>
+            <a:normAutofit/>
+          </a:bodyPr>
+          <a:lstStyle/>
+          <a:p>
+            <a:r>
+              <a:rPr lang="en-US">
+                <a:latin typeface="Arial"/>
+                <a:cs typeface="Arial"/>
+              </a:rPr>
+              <a:t>Demo</a:t>
+            </a:r>
+            <a:endParaRPr lang="en-US" dirty="0"/>
+          </a:p>
+        </p:txBody>
+      </p:sp>
+      <p:sp>
+        <p:nvSpPr>
+          <p:cNvPr id="3" name="Content Placeholder 2">
+            <a:extLst>
+              <a:ext uri="{FF2B5EF4-FFF2-40B4-BE49-F238E27FC236}">
+                <a16:creationId xmlns:a16="http://schemas.microsoft.com/office/drawing/2014/main" id="{6AE15947-8FDF-BE93-F3E8-F79B6D759AEC}"/>
+              </a:ext>
+            </a:extLst>
+          </p:cNvPr>
+          <p:cNvSpPr>
+            <a:spLocks noGrp="1"/>
+          </p:cNvSpPr>
+          <p:nvPr>
+            <p:ph idx="1"/>
+          </p:nvPr>
+        </p:nvSpPr>
+        <p:spPr>
+          <a:xfrm>
+            <a:off x="4209206" y="975572"/>
+            <a:ext cx="7041034" cy="4830655"/>
+          </a:xfrm>
+        </p:spPr>
+        <p:txBody>
+          <a:bodyPr vert="horz" lIns="91440" tIns="45720" rIns="91440" bIns="45720" rtlCol="0">
+            <a:normAutofit/>
+          </a:bodyPr>
+          <a:lstStyle/>
+          <a:p>
+            <a:pPr marL="0" indent="0" algn="ctr">
+              <a:buNone/>
+            </a:pPr>
+            <a:r>
+              <a:rPr lang="en-US" sz="5400" dirty="0">
+                <a:latin typeface="Times New Roman"/>
+                <a:ea typeface="+mn-lt"/>
+                <a:cs typeface="+mn-lt"/>
+                <a:hlinkClick r:id="rId2"/>
+              </a:rPr>
+              <a:t>Demo</a:t>
+            </a:r>
+            <a:endParaRPr lang="en-US" sz="5400" dirty="0">
+              <a:latin typeface="Times New Roman"/>
+              <a:cs typeface="Arial"/>
+            </a:endParaRPr>
+          </a:p>
+          <a:p>
+            <a:pPr marL="0" indent="0">
+              <a:buNone/>
+            </a:pPr>
+            <a:br>
+              <a:rPr lang="en-US" dirty="0"/>
+            </a:br>
+            <a:endParaRPr lang="en-US" dirty="0"/>
+          </a:p>
+        </p:txBody>
+      </p:sp>
+      <p:sp>
+        <p:nvSpPr>
+          <p:cNvPr id="12" name="Freeform: Shape 11">
+            <a:extLst>
+              <a:ext uri="{FF2B5EF4-FFF2-40B4-BE49-F238E27FC236}">
+                <a16:creationId xmlns:a16="http://schemas.microsoft.com/office/drawing/2014/main" id="{665C2FCD-09A4-4B4B-AA73-F330DFE91799}"/>
+              </a:ext>
+              <a:ext uri="{C183D7F6-B498-43B3-948B-1728B52AA6E4}">
+                <adec:decorative xmlns:adec="http://schemas.microsoft.com/office/drawing/2017/decorative" val="1"/>
+              </a:ext>
+            </a:extLst>
+          </p:cNvPr>
+          <p:cNvSpPr>
+            <a:spLocks noGrp="1" noRot="1" noChangeAspect="1" noMove="1" noResize="1" noEditPoints="1" noAdjustHandles="1" noChangeArrowheads="1" noChangeShapeType="1" noTextEdit="1"/>
+          </p:cNvSpPr>
+          <p:nvPr>
+            <p:extLst>
+              <p:ext uri="{386F3935-93C4-4BCD-93E2-E3B085C9AB24}">
+                <p16:designElem xmlns:p16="http://schemas.microsoft.com/office/powerpoint/2015/main" val="1"/>
+              </p:ext>
+            </p:extLst>
+          </p:nvPr>
+        </p:nvSpPr>
+        <p:spPr>
+          <a:xfrm flipH="1" flipV="1">
+            <a:off x="11190517" y="1056875"/>
+            <a:ext cx="1001483" cy="4744251"/>
+          </a:xfrm>
+          <a:custGeom>
+            <a:avLst/>
+            <a:gdLst>
+              <a:gd name="connsiteX0" fmla="*/ 0 w 1001483"/>
+              <a:gd name="connsiteY0" fmla="*/ 0 h 4744251"/>
+              <a:gd name="connsiteX1" fmla="*/ 1001483 w 1001483"/>
+              <a:gd name="connsiteY1" fmla="*/ 0 h 4744251"/>
+              <a:gd name="connsiteX2" fmla="*/ 0 w 1001483"/>
+              <a:gd name="connsiteY2" fmla="*/ 4744251 h 4744251"/>
+            </a:gdLst>
+            <a:ahLst/>
+            <a:cxnLst>
+              <a:cxn ang="0">
+                <a:pos x="connsiteX0" y="connsiteY0"/>
+              </a:cxn>
+              <a:cxn ang="0">
+                <a:pos x="connsiteX1" y="connsiteY1"/>
+              </a:cxn>
+              <a:cxn ang="0">
+                <a:pos x="connsiteX2" y="connsiteY2"/>
+              </a:cxn>
+            </a:cxnLst>
+            <a:rect l="l" t="t" r="r" b="b"/>
+            <a:pathLst>
+              <a:path w="1001483" h="4744251">
+                <a:moveTo>
+                  <a:pt x="0" y="0"/>
+                </a:moveTo>
+                <a:lnTo>
+                  <a:pt x="1001483" y="0"/>
+                </a:lnTo>
+                <a:lnTo>
+                  <a:pt x="0" y="4744251"/>
+                </a:lnTo>
+                <a:close/>
+              </a:path>
+            </a:pathLst>
+          </a:custGeom>
+          <a:solidFill>
+            <a:schemeClr val="accent1"/>
+          </a:solidFill>
+          <a:ln>
+            <a:noFill/>
+          </a:ln>
+        </p:spPr>
+        <p:style>
+          <a:lnRef idx="2">
+            <a:schemeClr val="accent1">
+              <a:shade val="50000"/>
+            </a:schemeClr>
+          </a:lnRef>
+          <a:fillRef idx="1">
+            <a:schemeClr val="accent1"/>
+          </a:fillRef>
+          <a:effectRef idx="0">
+            <a:schemeClr val="accent1"/>
+          </a:effectRef>
+          <a:fontRef idx="minor">
+            <a:schemeClr val="lt1"/>
+          </a:fontRef>
+        </p:style>
+      </p:sp>
+      <p:sp>
+        <p:nvSpPr>
+          <p:cNvPr id="4" name="TextBox 3">
+            <a:extLst>
+              <a:ext uri="{FF2B5EF4-FFF2-40B4-BE49-F238E27FC236}">
+                <a16:creationId xmlns:a16="http://schemas.microsoft.com/office/drawing/2014/main" id="{3C481653-19E9-C535-FF7E-4B9085DC65A5}"/>
+              </a:ext>
+            </a:extLst>
+          </p:cNvPr>
+          <p:cNvSpPr txBox="1"/>
+          <p:nvPr/>
+        </p:nvSpPr>
+        <p:spPr>
+          <a:xfrm>
+            <a:off x="4898571" y="3222171"/>
+            <a:ext cx="2743200" cy="457200"/>
+          </a:xfrm>
+          <a:prstGeom prst="rect">
+            <a:avLst/>
+          </a:prstGeom>
+          <a:noFill/>
+        </p:spPr>
+        <p:txBody>
+          <a:bodyPr rot="0" spcFirstLastPara="0" vertOverflow="overflow" horzOverflow="overflow" vert="horz" wrap="square" lIns="91440" tIns="45720" rIns="91440" bIns="45720" numCol="1" spcCol="0" rtlCol="0" fromWordArt="0" anchor="t" anchorCtr="0" forceAA="0" compatLnSpc="1">
+            <a:prstTxWarp prst="textNoShape">
+              <a:avLst/>
+            </a:prstTxWarp>
+            <a:spAutoFit/>
+          </a:bodyPr>
+          <a:lstStyle/>
+          <a:p>
+            <a:pPr algn="l"/>
+            <a:endParaRPr lang="en-US"/>
+          </a:p>
+        </p:txBody>
+      </p:sp>
+    </p:spTree>
+    <p:extLst>
+      <p:ext uri="{BB962C8B-B14F-4D97-AF65-F5344CB8AC3E}">
+        <p14:creationId xmlns:p14="http://schemas.microsoft.com/office/powerpoint/2010/main" val="3009311424"/>
+      </p:ext>
+    </p:extLst>
+  </p:cSld>
+  <p:clrMapOvr>
+    <a:overrideClrMapping bg1="dk1" tx1="lt1" bg2="dk2" tx2="lt2" accent1="accent1" accent2="accent2" accent3="accent3" accent4="accent4" accent5="accent5" accent6="accent6" hlink="hlink" folHlink="folHlink"/>
+  </p:clrMapOvr>
+  <mc:AlternateContent xmlns:mc="http://schemas.openxmlformats.org/markup-compatibility/2006" xmlns:p159="http://schemas.microsoft.com/office/powerpoint/2015/09/main">
+    <mc:Choice Requires="p159">
+      <p:transition spd="slow">
+        <p159:morph option="byObject"/>
+      </p:transition>
+    </mc:Choice>
+    <mc:Fallback xmlns="">
+      <p:transition spd="slow">
+        <p:fade/>
+      </p:transition>
+    </mc:Fallback>
+  </mc:AlternateContent>
+</p:sld>
+</file>
+
+<file path=ppt/slides/slide14.xml><?xml version="1.0" encoding="utf-8"?>
+<p:sld xmlns:a="http://schemas.openxmlformats.org/drawingml/2006/main" xmlns:r="http://schemas.openxmlformats.org/officeDocument/2006/relationships" xmlns:p="http://schemas.openxmlformats.org/presentationml/2006/main">
+  <p:cSld>
+    <p:bg>
+      <p:bgPr>
+        <a:solidFill>
+          <a:schemeClr val="bg1">
+            <a:tint val="95000"/>
+            <a:satMod val="170000"/>
+          </a:schemeClr>
+        </a:solidFill>
+        <a:effectLst/>
+      </p:bgPr>
+    </p:bg>
+    <p:spTree>
+      <p:nvGrpSpPr>
+        <p:cNvPr id="1" name=""/>
+        <p:cNvGrpSpPr/>
+        <p:nvPr/>
+      </p:nvGrpSpPr>
+      <p:grpSpPr>
+        <a:xfrm>
+          <a:off x="0" y="0"/>
+          <a:ext cx="0" cy="0"/>
+          <a:chOff x="0" y="0"/>
+          <a:chExt cx="0" cy="0"/>
+        </a:xfrm>
+      </p:grpSpPr>
+      <p:sp useBgFill="1">
+        <p:nvSpPr>
+          <p:cNvPr id="8" name="Rectangle 7">
+            <a:extLst>
+              <a:ext uri="{FF2B5EF4-FFF2-40B4-BE49-F238E27FC236}">
+                <a16:creationId xmlns:a16="http://schemas.microsoft.com/office/drawing/2014/main" id="{5DB23C2B-2054-4D8B-9E98-9190F8E05EAD}"/>
+              </a:ext>
+              <a:ext uri="{C183D7F6-B498-43B3-948B-1728B52AA6E4}">
+                <adec:decorative xmlns:adec="http://schemas.microsoft.com/office/drawing/2017/decorative" val="1"/>
+              </a:ext>
+            </a:extLst>
+          </p:cNvPr>
+          <p:cNvSpPr>
+            <a:spLocks noGrp="1" noRot="1" noChangeAspect="1" noMove="1" noResize="1" noEditPoints="1" noAdjustHandles="1" noChangeArrowheads="1" noChangeShapeType="1" noTextEdit="1"/>
+          </p:cNvSpPr>
+          <p:nvPr>
+            <p:extLst>
+              <p:ext uri="{386F3935-93C4-4BCD-93E2-E3B085C9AB24}">
+                <p16:designElem xmlns:p16="http://schemas.microsoft.com/office/powerpoint/2015/main" val="1"/>
+              </p:ext>
+            </p:extLst>
+          </p:nvPr>
+        </p:nvSpPr>
+        <p:spPr>
+          <a:xfrm>
+            <a:off x="0" y="0"/>
+            <a:ext cx="12192000" cy="6858000"/>
+          </a:xfrm>
+          <a:prstGeom prst="rect">
+            <a:avLst/>
+          </a:prstGeom>
+          <a:ln>
+            <a:noFill/>
+          </a:ln>
+        </p:spPr>
+        <p:style>
+          <a:lnRef idx="2">
+            <a:schemeClr val="accent1">
+              <a:shade val="50000"/>
+            </a:schemeClr>
+          </a:lnRef>
+          <a:fillRef idx="1">
+            <a:schemeClr val="accent1"/>
+          </a:fillRef>
+          <a:effectRef idx="0">
+            <a:schemeClr val="accent1"/>
+          </a:effectRef>
+          <a:fontRef idx="minor">
+            <a:schemeClr val="lt1"/>
+          </a:fontRef>
+        </p:style>
+        <p:txBody>
+          <a:bodyPr rtlCol="0" anchor="ctr"/>
+          <a:lstStyle/>
+          <a:p>
+            <a:pPr algn="ctr"/>
+            <a:endParaRPr lang="en-US"/>
+          </a:p>
+        </p:txBody>
+      </p:sp>
+      <p:sp>
+        <p:nvSpPr>
+          <p:cNvPr id="10" name="Freeform: Shape 9">
+            <a:extLst>
+              <a:ext uri="{FF2B5EF4-FFF2-40B4-BE49-F238E27FC236}">
+                <a16:creationId xmlns:a16="http://schemas.microsoft.com/office/drawing/2014/main" id="{8797B5BC-9873-45F9-97D6-298FB5AF08FF}"/>
+              </a:ext>
+              <a:ext uri="{C183D7F6-B498-43B3-948B-1728B52AA6E4}">
+                <adec:decorative xmlns:adec="http://schemas.microsoft.com/office/drawing/2017/decorative" val="1"/>
+              </a:ext>
+            </a:extLst>
+          </p:cNvPr>
+          <p:cNvSpPr>
+            <a:spLocks noGrp="1" noRot="1" noChangeAspect="1" noMove="1" noResize="1" noEditPoints="1" noAdjustHandles="1" noChangeArrowheads="1" noChangeShapeType="1" noTextEdit="1"/>
+          </p:cNvSpPr>
+          <p:nvPr>
+            <p:extLst>
+              <p:ext uri="{386F3935-93C4-4BCD-93E2-E3B085C9AB24}">
+                <p16:designElem xmlns:p16="http://schemas.microsoft.com/office/powerpoint/2015/main" val="1"/>
+              </p:ext>
+            </p:extLst>
+          </p:nvPr>
+        </p:nvSpPr>
+        <p:spPr>
+          <a:xfrm flipH="1" flipV="1">
+            <a:off x="0" y="762000"/>
+            <a:ext cx="4208489" cy="5334001"/>
+          </a:xfrm>
+          <a:custGeom>
+            <a:avLst/>
+            <a:gdLst>
+              <a:gd name="connsiteX0" fmla="*/ 1015642 w 4208489"/>
+              <a:gd name="connsiteY0" fmla="*/ 0 h 5334001"/>
+              <a:gd name="connsiteX1" fmla="*/ 4208489 w 4208489"/>
+              <a:gd name="connsiteY1" fmla="*/ 0 h 5334001"/>
+              <a:gd name="connsiteX2" fmla="*/ 4208489 w 4208489"/>
+              <a:gd name="connsiteY2" fmla="*/ 5334001 h 5334001"/>
+              <a:gd name="connsiteX3" fmla="*/ 0 w 4208489"/>
+              <a:gd name="connsiteY3" fmla="*/ 5334001 h 5334001"/>
+            </a:gdLst>
+            <a:ahLst/>
+            <a:cxnLst>
+              <a:cxn ang="0">
+                <a:pos x="connsiteX0" y="connsiteY0"/>
+              </a:cxn>
+              <a:cxn ang="0">
+                <a:pos x="connsiteX1" y="connsiteY1"/>
+              </a:cxn>
+              <a:cxn ang="0">
+                <a:pos x="connsiteX2" y="connsiteY2"/>
+              </a:cxn>
+              <a:cxn ang="0">
+                <a:pos x="connsiteX3" y="connsiteY3"/>
+              </a:cxn>
+            </a:cxnLst>
+            <a:rect l="l" t="t" r="r" b="b"/>
+            <a:pathLst>
+              <a:path w="4208489" h="5334001">
+                <a:moveTo>
+                  <a:pt x="1015642" y="0"/>
+                </a:moveTo>
+                <a:lnTo>
+                  <a:pt x="4208489" y="0"/>
+                </a:lnTo>
+                <a:lnTo>
+                  <a:pt x="4208489" y="5334001"/>
+                </a:lnTo>
+                <a:lnTo>
+                  <a:pt x="0" y="5334001"/>
+                </a:lnTo>
+                <a:close/>
+              </a:path>
+            </a:pathLst>
+          </a:custGeom>
+          <a:solidFill>
+            <a:schemeClr val="accent1"/>
+          </a:solidFill>
+          <a:ln>
+            <a:noFill/>
+          </a:ln>
+        </p:spPr>
+        <p:style>
+          <a:lnRef idx="2">
+            <a:schemeClr val="accent1">
+              <a:shade val="50000"/>
+            </a:schemeClr>
+          </a:lnRef>
+          <a:fillRef idx="1">
+            <a:schemeClr val="accent1"/>
+          </a:fillRef>
+          <a:effectRef idx="0">
+            <a:schemeClr val="accent1"/>
+          </a:effectRef>
+          <a:fontRef idx="minor">
+            <a:schemeClr val="lt1"/>
+          </a:fontRef>
+        </p:style>
+      </p:sp>
+      <p:sp>
+        <p:nvSpPr>
+          <p:cNvPr id="2" name="Title 1">
+            <a:extLst>
+              <a:ext uri="{FF2B5EF4-FFF2-40B4-BE49-F238E27FC236}">
+                <a16:creationId xmlns:a16="http://schemas.microsoft.com/office/drawing/2014/main" id="{E375277E-7BB5-7D0C-BEE7-5324E35BD96D}"/>
+              </a:ext>
+            </a:extLst>
+          </p:cNvPr>
+          <p:cNvSpPr>
+            <a:spLocks noGrp="1"/>
+          </p:cNvSpPr>
+          <p:nvPr>
+            <p:ph type="title"/>
+          </p:nvPr>
+        </p:nvSpPr>
+        <p:spPr>
+          <a:xfrm>
+            <a:off x="494260" y="1683144"/>
+            <a:ext cx="2774922" cy="3491712"/>
+          </a:xfrm>
+        </p:spPr>
+        <p:txBody>
+          <a:bodyPr>
+            <a:normAutofit/>
+          </a:bodyPr>
+          <a:lstStyle/>
+          <a:p>
+            <a:r>
+              <a:rPr lang="en-US">
+                <a:latin typeface="Arial"/>
+                <a:cs typeface="Arial"/>
+              </a:rPr>
+              <a:t>Conclusion</a:t>
+            </a:r>
+            <a:endParaRPr lang="en-US" dirty="0"/>
+          </a:p>
+        </p:txBody>
+      </p:sp>
+      <p:sp>
+        <p:nvSpPr>
+          <p:cNvPr id="3" name="Content Placeholder 2">
+            <a:extLst>
+              <a:ext uri="{FF2B5EF4-FFF2-40B4-BE49-F238E27FC236}">
+                <a16:creationId xmlns:a16="http://schemas.microsoft.com/office/drawing/2014/main" id="{9E42F045-48E9-C929-8E87-20218771B32A}"/>
+              </a:ext>
+            </a:extLst>
+          </p:cNvPr>
+          <p:cNvSpPr>
+            <a:spLocks noGrp="1"/>
+          </p:cNvSpPr>
+          <p:nvPr>
+            <p:ph idx="1"/>
+          </p:nvPr>
+        </p:nvSpPr>
+        <p:spPr>
+          <a:xfrm>
+            <a:off x="3882636" y="649000"/>
+            <a:ext cx="7824803" cy="6049855"/>
+          </a:xfrm>
+        </p:spPr>
+        <p:txBody>
+          <a:bodyPr vert="horz" lIns="91440" tIns="45720" rIns="91440" bIns="45720" rtlCol="0">
+            <a:normAutofit/>
+          </a:bodyPr>
+          <a:lstStyle/>
+          <a:p>
+            <a:r>
+              <a:rPr lang="en-US" sz="2400" dirty="0">
+                <a:latin typeface="Arial"/>
+                <a:cs typeface="Arial"/>
+              </a:rPr>
+              <a:t>In summary, the Wheel Wise Insurance Management System offers an all-inclusive solution for the client's insurance business, focusing on policy, claim, customer, premium, and reporting management. The system streamlines processes, enhances user experience, and improves decision-making. With robust security measures and external integrations, it ensures regulatory compliance and lowers operational costs. </a:t>
+            </a:r>
+            <a:endParaRPr lang="en-US" sz="2400" dirty="0">
+              <a:latin typeface="Corbel" panose="020B0503020204020204"/>
+              <a:cs typeface="Calibri" panose="020F0502020204030204"/>
+            </a:endParaRPr>
+          </a:p>
+          <a:p>
+            <a:r>
+              <a:rPr lang="en-US" sz="2400" dirty="0">
+                <a:latin typeface="Arial"/>
+                <a:cs typeface="Arial"/>
+              </a:rPr>
+              <a:t>Overall, the Wheel Wise Insurance Management System brings substantial value to the client's business, promoting growth and success in the competitive insurance industry.</a:t>
+            </a:r>
+            <a:endParaRPr lang="en-US" sz="2400">
+              <a:cs typeface="Calibri" panose="020F0502020204030204"/>
+            </a:endParaRPr>
+          </a:p>
+          <a:p>
+            <a:pPr marL="0" indent="0" algn="just">
+              <a:buNone/>
+            </a:pPr>
+            <a:br>
+              <a:rPr lang="en-US" dirty="0"/>
+            </a:br>
+            <a:endParaRPr lang="en-US" dirty="0"/>
+          </a:p>
+        </p:txBody>
+      </p:sp>
+      <p:sp>
+        <p:nvSpPr>
+          <p:cNvPr id="12" name="Freeform: Shape 11">
+            <a:extLst>
+              <a:ext uri="{FF2B5EF4-FFF2-40B4-BE49-F238E27FC236}">
+                <a16:creationId xmlns:a16="http://schemas.microsoft.com/office/drawing/2014/main" id="{665C2FCD-09A4-4B4B-AA73-F330DFE91799}"/>
+              </a:ext>
+              <a:ext uri="{C183D7F6-B498-43B3-948B-1728B52AA6E4}">
+                <adec:decorative xmlns:adec="http://schemas.microsoft.com/office/drawing/2017/decorative" val="1"/>
+              </a:ext>
+            </a:extLst>
+          </p:cNvPr>
+          <p:cNvSpPr>
+            <a:spLocks noGrp="1" noRot="1" noChangeAspect="1" noMove="1" noResize="1" noEditPoints="1" noAdjustHandles="1" noChangeArrowheads="1" noChangeShapeType="1" noTextEdit="1"/>
+          </p:cNvSpPr>
+          <p:nvPr>
+            <p:extLst>
+              <p:ext uri="{386F3935-93C4-4BCD-93E2-E3B085C9AB24}">
+                <p16:designElem xmlns:p16="http://schemas.microsoft.com/office/powerpoint/2015/main" val="1"/>
+              </p:ext>
+            </p:extLst>
+          </p:nvPr>
+        </p:nvSpPr>
+        <p:spPr>
+          <a:xfrm flipH="1" flipV="1">
+            <a:off x="11190517" y="1056875"/>
+            <a:ext cx="1001483" cy="4744251"/>
+          </a:xfrm>
+          <a:custGeom>
+            <a:avLst/>
+            <a:gdLst>
+              <a:gd name="connsiteX0" fmla="*/ 0 w 1001483"/>
+              <a:gd name="connsiteY0" fmla="*/ 0 h 4744251"/>
+              <a:gd name="connsiteX1" fmla="*/ 1001483 w 1001483"/>
+              <a:gd name="connsiteY1" fmla="*/ 0 h 4744251"/>
+              <a:gd name="connsiteX2" fmla="*/ 0 w 1001483"/>
+              <a:gd name="connsiteY2" fmla="*/ 4744251 h 4744251"/>
+            </a:gdLst>
+            <a:ahLst/>
+            <a:cxnLst>
+              <a:cxn ang="0">
+                <a:pos x="connsiteX0" y="connsiteY0"/>
+              </a:cxn>
+              <a:cxn ang="0">
+                <a:pos x="connsiteX1" y="connsiteY1"/>
+              </a:cxn>
+              <a:cxn ang="0">
+                <a:pos x="connsiteX2" y="connsiteY2"/>
+              </a:cxn>
+            </a:cxnLst>
+            <a:rect l="l" t="t" r="r" b="b"/>
+            <a:pathLst>
+              <a:path w="1001483" h="4744251">
+                <a:moveTo>
+                  <a:pt x="0" y="0"/>
+                </a:moveTo>
+                <a:lnTo>
+                  <a:pt x="1001483" y="0"/>
+                </a:lnTo>
+                <a:lnTo>
+                  <a:pt x="0" y="4744251"/>
+                </a:lnTo>
+                <a:close/>
+              </a:path>
+            </a:pathLst>
+          </a:custGeom>
+          <a:solidFill>
+            <a:schemeClr val="accent1"/>
+          </a:solidFill>
+          <a:ln>
+            <a:noFill/>
+          </a:ln>
+        </p:spPr>
+        <p:style>
+          <a:lnRef idx="2">
+            <a:schemeClr val="accent1">
+              <a:shade val="50000"/>
+            </a:schemeClr>
+          </a:lnRef>
+          <a:fillRef idx="1">
+            <a:schemeClr val="accent1"/>
+          </a:fillRef>
+          <a:effectRef idx="0">
+            <a:schemeClr val="accent1"/>
+          </a:effectRef>
+          <a:fontRef idx="minor">
+            <a:schemeClr val="lt1"/>
+          </a:fontRef>
+        </p:style>
+      </p:sp>
+    </p:spTree>
+    <p:extLst>
+      <p:ext uri="{BB962C8B-B14F-4D97-AF65-F5344CB8AC3E}">
         <p14:creationId xmlns:p14="http://schemas.microsoft.com/office/powerpoint/2010/main" val="2487785380"/>
       </p:ext>
     </p:extLst>
@@ -5219,7 +6190,419 @@
 </p:sld>
 </file>
 
-<file path=ppt/slides/slide13.xml><?xml version="1.0" encoding="utf-8"?>
+<file path=ppt/slides/slide15.xml><?xml version="1.0" encoding="utf-8"?>
+<p:sld xmlns:a="http://schemas.openxmlformats.org/drawingml/2006/main" xmlns:r="http://schemas.openxmlformats.org/officeDocument/2006/relationships" xmlns:p="http://schemas.openxmlformats.org/presentationml/2006/main">
+  <p:cSld>
+    <p:bg>
+      <p:bgPr>
+        <a:solidFill>
+          <a:schemeClr val="bg1">
+            <a:tint val="95000"/>
+            <a:satMod val="170000"/>
+          </a:schemeClr>
+        </a:solidFill>
+        <a:effectLst/>
+      </p:bgPr>
+    </p:bg>
+    <p:spTree>
+      <p:nvGrpSpPr>
+        <p:cNvPr id="1" name=""/>
+        <p:cNvGrpSpPr/>
+        <p:nvPr/>
+      </p:nvGrpSpPr>
+      <p:grpSpPr>
+        <a:xfrm>
+          <a:off x="0" y="0"/>
+          <a:ext cx="0" cy="0"/>
+          <a:chOff x="0" y="0"/>
+          <a:chExt cx="0" cy="0"/>
+        </a:xfrm>
+      </p:grpSpPr>
+      <p:sp useBgFill="1">
+        <p:nvSpPr>
+          <p:cNvPr id="8" name="Rectangle 7">
+            <a:extLst>
+              <a:ext uri="{FF2B5EF4-FFF2-40B4-BE49-F238E27FC236}">
+                <a16:creationId xmlns:a16="http://schemas.microsoft.com/office/drawing/2014/main" id="{5DB23C2B-2054-4D8B-9E98-9190F8E05EAD}"/>
+              </a:ext>
+              <a:ext uri="{C183D7F6-B498-43B3-948B-1728B52AA6E4}">
+                <adec:decorative xmlns:adec="http://schemas.microsoft.com/office/drawing/2017/decorative" val="1"/>
+              </a:ext>
+            </a:extLst>
+          </p:cNvPr>
+          <p:cNvSpPr>
+            <a:spLocks noGrp="1" noRot="1" noChangeAspect="1" noMove="1" noResize="1" noEditPoints="1" noAdjustHandles="1" noChangeArrowheads="1" noChangeShapeType="1" noTextEdit="1"/>
+          </p:cNvSpPr>
+          <p:nvPr>
+            <p:extLst>
+              <p:ext uri="{386F3935-93C4-4BCD-93E2-E3B085C9AB24}">
+                <p16:designElem xmlns:p16="http://schemas.microsoft.com/office/powerpoint/2015/main" val="1"/>
+              </p:ext>
+            </p:extLst>
+          </p:nvPr>
+        </p:nvSpPr>
+        <p:spPr>
+          <a:xfrm>
+            <a:off x="0" y="0"/>
+            <a:ext cx="12192000" cy="6858000"/>
+          </a:xfrm>
+          <a:prstGeom prst="rect">
+            <a:avLst/>
+          </a:prstGeom>
+          <a:ln>
+            <a:noFill/>
+          </a:ln>
+        </p:spPr>
+        <p:style>
+          <a:lnRef idx="2">
+            <a:schemeClr val="accent1">
+              <a:shade val="50000"/>
+            </a:schemeClr>
+          </a:lnRef>
+          <a:fillRef idx="1">
+            <a:schemeClr val="accent1"/>
+          </a:fillRef>
+          <a:effectRef idx="0">
+            <a:schemeClr val="accent1"/>
+          </a:effectRef>
+          <a:fontRef idx="minor">
+            <a:schemeClr val="lt1"/>
+          </a:fontRef>
+        </p:style>
+        <p:txBody>
+          <a:bodyPr rtlCol="0" anchor="ctr"/>
+          <a:lstStyle/>
+          <a:p>
+            <a:pPr algn="ctr"/>
+            <a:endParaRPr lang="en-US"/>
+          </a:p>
+        </p:txBody>
+      </p:sp>
+      <p:sp>
+        <p:nvSpPr>
+          <p:cNvPr id="10" name="Freeform: Shape 9">
+            <a:extLst>
+              <a:ext uri="{FF2B5EF4-FFF2-40B4-BE49-F238E27FC236}">
+                <a16:creationId xmlns:a16="http://schemas.microsoft.com/office/drawing/2014/main" id="{8797B5BC-9873-45F9-97D6-298FB5AF08FF}"/>
+              </a:ext>
+              <a:ext uri="{C183D7F6-B498-43B3-948B-1728B52AA6E4}">
+                <adec:decorative xmlns:adec="http://schemas.microsoft.com/office/drawing/2017/decorative" val="1"/>
+              </a:ext>
+            </a:extLst>
+          </p:cNvPr>
+          <p:cNvSpPr>
+            <a:spLocks noGrp="1" noRot="1" noChangeAspect="1" noMove="1" noResize="1" noEditPoints="1" noAdjustHandles="1" noChangeArrowheads="1" noChangeShapeType="1" noTextEdit="1"/>
+          </p:cNvSpPr>
+          <p:nvPr>
+            <p:extLst>
+              <p:ext uri="{386F3935-93C4-4BCD-93E2-E3B085C9AB24}">
+                <p16:designElem xmlns:p16="http://schemas.microsoft.com/office/powerpoint/2015/main" val="1"/>
+              </p:ext>
+            </p:extLst>
+          </p:nvPr>
+        </p:nvSpPr>
+        <p:spPr>
+          <a:xfrm flipH="1" flipV="1">
+            <a:off x="0" y="762000"/>
+            <a:ext cx="4208489" cy="5334001"/>
+          </a:xfrm>
+          <a:custGeom>
+            <a:avLst/>
+            <a:gdLst>
+              <a:gd name="connsiteX0" fmla="*/ 1015642 w 4208489"/>
+              <a:gd name="connsiteY0" fmla="*/ 0 h 5334001"/>
+              <a:gd name="connsiteX1" fmla="*/ 4208489 w 4208489"/>
+              <a:gd name="connsiteY1" fmla="*/ 0 h 5334001"/>
+              <a:gd name="connsiteX2" fmla="*/ 4208489 w 4208489"/>
+              <a:gd name="connsiteY2" fmla="*/ 5334001 h 5334001"/>
+              <a:gd name="connsiteX3" fmla="*/ 0 w 4208489"/>
+              <a:gd name="connsiteY3" fmla="*/ 5334001 h 5334001"/>
+            </a:gdLst>
+            <a:ahLst/>
+            <a:cxnLst>
+              <a:cxn ang="0">
+                <a:pos x="connsiteX0" y="connsiteY0"/>
+              </a:cxn>
+              <a:cxn ang="0">
+                <a:pos x="connsiteX1" y="connsiteY1"/>
+              </a:cxn>
+              <a:cxn ang="0">
+                <a:pos x="connsiteX2" y="connsiteY2"/>
+              </a:cxn>
+              <a:cxn ang="0">
+                <a:pos x="connsiteX3" y="connsiteY3"/>
+              </a:cxn>
+            </a:cxnLst>
+            <a:rect l="l" t="t" r="r" b="b"/>
+            <a:pathLst>
+              <a:path w="4208489" h="5334001">
+                <a:moveTo>
+                  <a:pt x="1015642" y="0"/>
+                </a:moveTo>
+                <a:lnTo>
+                  <a:pt x="4208489" y="0"/>
+                </a:lnTo>
+                <a:lnTo>
+                  <a:pt x="4208489" y="5334001"/>
+                </a:lnTo>
+                <a:lnTo>
+                  <a:pt x="0" y="5334001"/>
+                </a:lnTo>
+                <a:close/>
+              </a:path>
+            </a:pathLst>
+          </a:custGeom>
+          <a:solidFill>
+            <a:schemeClr val="accent1"/>
+          </a:solidFill>
+          <a:ln>
+            <a:noFill/>
+          </a:ln>
+        </p:spPr>
+        <p:style>
+          <a:lnRef idx="2">
+            <a:schemeClr val="accent1">
+              <a:shade val="50000"/>
+            </a:schemeClr>
+          </a:lnRef>
+          <a:fillRef idx="1">
+            <a:schemeClr val="accent1"/>
+          </a:fillRef>
+          <a:effectRef idx="0">
+            <a:schemeClr val="accent1"/>
+          </a:effectRef>
+          <a:fontRef idx="minor">
+            <a:schemeClr val="lt1"/>
+          </a:fontRef>
+        </p:style>
+      </p:sp>
+      <p:sp>
+        <p:nvSpPr>
+          <p:cNvPr id="2" name="Title 1">
+            <a:extLst>
+              <a:ext uri="{FF2B5EF4-FFF2-40B4-BE49-F238E27FC236}">
+                <a16:creationId xmlns:a16="http://schemas.microsoft.com/office/drawing/2014/main" id="{E375277E-7BB5-7D0C-BEE7-5324E35BD96D}"/>
+              </a:ext>
+            </a:extLst>
+          </p:cNvPr>
+          <p:cNvSpPr>
+            <a:spLocks noGrp="1"/>
+          </p:cNvSpPr>
+          <p:nvPr>
+            <p:ph type="title"/>
+          </p:nvPr>
+        </p:nvSpPr>
+        <p:spPr>
+          <a:xfrm>
+            <a:off x="494260" y="1683144"/>
+            <a:ext cx="2774922" cy="3491712"/>
+          </a:xfrm>
+        </p:spPr>
+        <p:txBody>
+          <a:bodyPr>
+            <a:normAutofit/>
+          </a:bodyPr>
+          <a:lstStyle/>
+          <a:p>
+            <a:r>
+              <a:rPr lang="en-US" dirty="0">
+                <a:latin typeface="Arial"/>
+                <a:cs typeface="Arial"/>
+              </a:rPr>
+              <a:t>Reference</a:t>
+            </a:r>
+            <a:endParaRPr lang="en-US" dirty="0"/>
+          </a:p>
+        </p:txBody>
+      </p:sp>
+      <p:sp>
+        <p:nvSpPr>
+          <p:cNvPr id="3" name="Content Placeholder 2">
+            <a:extLst>
+              <a:ext uri="{FF2B5EF4-FFF2-40B4-BE49-F238E27FC236}">
+                <a16:creationId xmlns:a16="http://schemas.microsoft.com/office/drawing/2014/main" id="{9E42F045-48E9-C929-8E87-20218771B32A}"/>
+              </a:ext>
+            </a:extLst>
+          </p:cNvPr>
+          <p:cNvSpPr>
+            <a:spLocks noGrp="1"/>
+          </p:cNvSpPr>
+          <p:nvPr>
+            <p:ph idx="1"/>
+          </p:nvPr>
+        </p:nvSpPr>
+        <p:spPr>
+          <a:xfrm>
+            <a:off x="3882636" y="649000"/>
+            <a:ext cx="7824803" cy="6049855"/>
+          </a:xfrm>
+        </p:spPr>
+        <p:txBody>
+          <a:bodyPr vert="horz" lIns="91440" tIns="45720" rIns="91440" bIns="45720" rtlCol="0">
+            <a:normAutofit/>
+          </a:bodyPr>
+          <a:lstStyle/>
+          <a:p>
+            <a:pPr algn="just"/>
+            <a:r>
+              <a:rPr lang="en-US" dirty="0">
+                <a:hlinkClick r:id="rId2"/>
+              </a:rPr>
+              <a:t>https://www.projectmanagement.com/contentPages/wiki.cfm?ID=396744&amp;thisPageURL=/wikis/396744/Change-Management-Process-for-Project#_=_</a:t>
+            </a:r>
+            <a:endParaRPr lang="en-US" dirty="0"/>
+          </a:p>
+          <a:p>
+            <a:pPr algn="just"/>
+            <a:r>
+              <a:rPr lang="en-US" dirty="0">
+                <a:hlinkClick r:id="rId3"/>
+              </a:rPr>
+              <a:t>https://legacy.reactjs.org/docs/getting-started.html</a:t>
+            </a:r>
+            <a:endParaRPr lang="en-US" dirty="0"/>
+          </a:p>
+          <a:p>
+            <a:pPr algn="just"/>
+            <a:r>
+              <a:rPr lang="en-US" dirty="0">
+                <a:hlinkClick r:id="rId4"/>
+              </a:rPr>
+              <a:t>https://www.w3schools.com/asp/</a:t>
+            </a:r>
+            <a:endParaRPr lang="en-US" dirty="0"/>
+          </a:p>
+          <a:p>
+            <a:pPr algn="just"/>
+            <a:endParaRPr lang="en-US" dirty="0"/>
+          </a:p>
+          <a:p>
+            <a:pPr marL="0" indent="0" algn="just">
+              <a:buNone/>
+            </a:pPr>
+            <a:br>
+              <a:rPr lang="en-US" dirty="0"/>
+            </a:br>
+            <a:endParaRPr lang="en-US" dirty="0"/>
+          </a:p>
+        </p:txBody>
+      </p:sp>
+      <p:sp>
+        <p:nvSpPr>
+          <p:cNvPr id="12" name="Freeform: Shape 11">
+            <a:extLst>
+              <a:ext uri="{FF2B5EF4-FFF2-40B4-BE49-F238E27FC236}">
+                <a16:creationId xmlns:a16="http://schemas.microsoft.com/office/drawing/2014/main" id="{665C2FCD-09A4-4B4B-AA73-F330DFE91799}"/>
+              </a:ext>
+              <a:ext uri="{C183D7F6-B498-43B3-948B-1728B52AA6E4}">
+                <adec:decorative xmlns:adec="http://schemas.microsoft.com/office/drawing/2017/decorative" val="1"/>
+              </a:ext>
+            </a:extLst>
+          </p:cNvPr>
+          <p:cNvSpPr>
+            <a:spLocks noGrp="1" noRot="1" noChangeAspect="1" noMove="1" noResize="1" noEditPoints="1" noAdjustHandles="1" noChangeArrowheads="1" noChangeShapeType="1" noTextEdit="1"/>
+          </p:cNvSpPr>
+          <p:nvPr>
+            <p:extLst>
+              <p:ext uri="{386F3935-93C4-4BCD-93E2-E3B085C9AB24}">
+                <p16:designElem xmlns:p16="http://schemas.microsoft.com/office/powerpoint/2015/main" val="1"/>
+              </p:ext>
+            </p:extLst>
+          </p:nvPr>
+        </p:nvSpPr>
+        <p:spPr>
+          <a:xfrm flipH="1" flipV="1">
+            <a:off x="11190517" y="1056875"/>
+            <a:ext cx="1001483" cy="4744251"/>
+          </a:xfrm>
+          <a:custGeom>
+            <a:avLst/>
+            <a:gdLst>
+              <a:gd name="connsiteX0" fmla="*/ 0 w 1001483"/>
+              <a:gd name="connsiteY0" fmla="*/ 0 h 4744251"/>
+              <a:gd name="connsiteX1" fmla="*/ 1001483 w 1001483"/>
+              <a:gd name="connsiteY1" fmla="*/ 0 h 4744251"/>
+              <a:gd name="connsiteX2" fmla="*/ 0 w 1001483"/>
+              <a:gd name="connsiteY2" fmla="*/ 4744251 h 4744251"/>
+            </a:gdLst>
+            <a:ahLst/>
+            <a:cxnLst>
+              <a:cxn ang="0">
+                <a:pos x="connsiteX0" y="connsiteY0"/>
+              </a:cxn>
+              <a:cxn ang="0">
+                <a:pos x="connsiteX1" y="connsiteY1"/>
+              </a:cxn>
+              <a:cxn ang="0">
+                <a:pos x="connsiteX2" y="connsiteY2"/>
+              </a:cxn>
+            </a:cxnLst>
+            <a:rect l="l" t="t" r="r" b="b"/>
+            <a:pathLst>
+              <a:path w="1001483" h="4744251">
+                <a:moveTo>
+                  <a:pt x="0" y="0"/>
+                </a:moveTo>
+                <a:lnTo>
+                  <a:pt x="1001483" y="0"/>
+                </a:lnTo>
+                <a:lnTo>
+                  <a:pt x="0" y="4744251"/>
+                </a:lnTo>
+                <a:close/>
+              </a:path>
+            </a:pathLst>
+          </a:custGeom>
+          <a:solidFill>
+            <a:schemeClr val="accent1"/>
+          </a:solidFill>
+          <a:ln>
+            <a:noFill/>
+          </a:ln>
+        </p:spPr>
+        <p:style>
+          <a:lnRef idx="2">
+            <a:schemeClr val="accent1">
+              <a:shade val="50000"/>
+            </a:schemeClr>
+          </a:lnRef>
+          <a:fillRef idx="1">
+            <a:schemeClr val="accent1"/>
+          </a:fillRef>
+          <a:effectRef idx="0">
+            <a:schemeClr val="accent1"/>
+          </a:effectRef>
+          <a:fontRef idx="minor">
+            <a:schemeClr val="lt1"/>
+          </a:fontRef>
+        </p:style>
+      </p:sp>
+    </p:spTree>
+    <p:extLst>
+      <p:ext uri="{BB962C8B-B14F-4D97-AF65-F5344CB8AC3E}">
+        <p14:creationId xmlns:p14="http://schemas.microsoft.com/office/powerpoint/2010/main" val="3408717991"/>
+      </p:ext>
+    </p:extLst>
+  </p:cSld>
+  <p:clrMapOvr>
+    <a:overrideClrMapping bg1="dk1" tx1="lt1" bg2="dk2" tx2="lt2" accent1="accent1" accent2="accent2" accent3="accent3" accent4="accent4" accent5="accent5" accent6="accent6" hlink="hlink" folHlink="folHlink"/>
+  </p:clrMapOvr>
+  <mc:AlternateContent xmlns:mc="http://schemas.openxmlformats.org/markup-compatibility/2006" xmlns:p159="http://schemas.microsoft.com/office/powerpoint/2015/09/main">
+    <mc:Choice Requires="p159">
+      <p:transition spd="slow">
+        <p159:morph option="byObject"/>
+      </p:transition>
+    </mc:Choice>
+    <mc:Fallback xmlns="">
+      <p:transition spd="slow">
+        <p:fade/>
+      </p:transition>
+    </mc:Fallback>
+  </mc:AlternateContent>
+</p:sld>
+</file>
+
+<file path=ppt/slides/slide16.xml><?xml version="1.0" encoding="utf-8"?>
 <p:sld xmlns:a="http://schemas.openxmlformats.org/drawingml/2006/main" xmlns:r="http://schemas.openxmlformats.org/officeDocument/2006/relationships" xmlns:p="http://schemas.openxmlformats.org/presentationml/2006/main">
   <p:cSld>
     <p:bg>
@@ -7894,7 +9277,7 @@
           <p:cNvPr id="2" name="Title 1">
             <a:extLst>
               <a:ext uri="{FF2B5EF4-FFF2-40B4-BE49-F238E27FC236}">
-                <a16:creationId xmlns:a16="http://schemas.microsoft.com/office/drawing/2014/main" id="{DD652B41-DB2B-8457-517B-809649E2BC49}"/>
+                <a16:creationId xmlns:a16="http://schemas.microsoft.com/office/drawing/2014/main" id="{C24D214F-C7B2-E7D7-2A7A-1DA45733B142}"/>
               </a:ext>
             </a:extLst>
           </p:cNvPr>
@@ -7918,11 +9301,11 @@
           <a:lstStyle/>
           <a:p>
             <a:r>
-              <a:rPr lang="en-US">
+              <a:rPr lang="en-US" dirty="0">
                 <a:latin typeface="Arial"/>
                 <a:cs typeface="Arial"/>
               </a:rPr>
-              <a:t>Security Measures</a:t>
+              <a:t> System Functionality Testing</a:t>
             </a:r>
             <a:endParaRPr lang="en-US" dirty="0"/>
           </a:p>
@@ -7939,7 +9322,7 @@
           <p:cNvPr id="3" name="Content Placeholder 2">
             <a:extLst>
               <a:ext uri="{FF2B5EF4-FFF2-40B4-BE49-F238E27FC236}">
-                <a16:creationId xmlns:a16="http://schemas.microsoft.com/office/drawing/2014/main" id="{12BBF245-F833-E55D-CF79-B7D67EB699B0}"/>
+                <a16:creationId xmlns:a16="http://schemas.microsoft.com/office/drawing/2014/main" id="{E1829627-61A1-6F34-684F-7964BC40705E}"/>
               </a:ext>
             </a:extLst>
           </p:cNvPr>
@@ -7952,97 +9335,23 @@
         </p:nvSpPr>
         <p:spPr>
           <a:xfrm>
-            <a:off x="4137220" y="659535"/>
-            <a:ext cx="7051919" cy="6507055"/>
+            <a:off x="4209206" y="725200"/>
+            <a:ext cx="6627377" cy="4765341"/>
           </a:xfrm>
         </p:spPr>
         <p:txBody>
           <a:bodyPr vert="horz" lIns="91440" tIns="45720" rIns="91440" bIns="45720" rtlCol="0">
-            <a:normAutofit lnSpcReduction="10000"/>
+            <a:normAutofit/>
           </a:bodyPr>
           <a:lstStyle/>
-          <a:p>
-            <a:r>
-              <a:rPr lang="en-US" sz="2400" dirty="0">
-                <a:latin typeface="Arial"/>
-                <a:cs typeface="Arial"/>
-              </a:rPr>
-              <a:t>The Wheel Wise Insurance Management System employs security measures to protect data confidentiality, integrity, and availability. These include:</a:t>
-            </a:r>
-            <a:endParaRPr lang="en-US" sz="2400">
-              <a:latin typeface="Corbel" panose="020B0503020204020204"/>
-              <a:cs typeface="Calibri" panose="020F0502020204030204"/>
-            </a:endParaRPr>
-          </a:p>
-          <a:p>
-            <a:pPr lvl="1" indent="0"/>
-            <a:r>
-              <a:rPr lang="en-US" sz="2400" dirty="0">
-                <a:latin typeface="Arial"/>
-                <a:cs typeface="Arial"/>
-              </a:rPr>
-              <a:t> Data encryption for both in-transit and at-rest data, </a:t>
-            </a:r>
-            <a:endParaRPr lang="en-US" sz="2400">
-              <a:latin typeface="Corbel" panose="020B0503020204020204"/>
-              <a:cs typeface="Calibri" panose="020F0502020204030204"/>
-            </a:endParaRPr>
-          </a:p>
-          <a:p>
-            <a:pPr lvl="1" indent="0"/>
-            <a:r>
-              <a:rPr lang="en-US" sz="2400" dirty="0">
-                <a:latin typeface="Arial"/>
-                <a:cs typeface="Arial"/>
-              </a:rPr>
-              <a:t> Authentication using secure login credentials, and </a:t>
-            </a:r>
-            <a:endParaRPr lang="en-US" sz="2400">
-              <a:latin typeface="Corbel" panose="020B0503020204020204"/>
-              <a:cs typeface="Calibri" panose="020F0502020204030204"/>
-            </a:endParaRPr>
-          </a:p>
-          <a:p>
-            <a:pPr lvl="1" indent="0"/>
-            <a:r>
-              <a:rPr lang="en-US" sz="2400" dirty="0">
-                <a:latin typeface="Arial"/>
-                <a:cs typeface="Arial"/>
-              </a:rPr>
-              <a:t> Role-based access control (RBAC) for authorization. </a:t>
-            </a:r>
-            <a:endParaRPr lang="en-US" sz="2400">
-              <a:latin typeface="Corbel" panose="020B0503020204020204"/>
-              <a:cs typeface="Calibri" panose="020F0502020204030204"/>
-            </a:endParaRPr>
-          </a:p>
-          <a:p>
-            <a:pPr lvl="1" indent="0"/>
-            <a:endParaRPr lang="en-US" sz="2400" dirty="0">
-              <a:latin typeface="Arial"/>
-              <a:cs typeface="Arial"/>
-            </a:endParaRPr>
-          </a:p>
-          <a:p>
-            <a:r>
-              <a:rPr lang="en-US" sz="2400" dirty="0">
-                <a:latin typeface="Arial"/>
-                <a:cs typeface="Arial"/>
-              </a:rPr>
-              <a:t>The system adheres to specific compliance requirements and secures sensitive information, such as customer details, policy data, and payment information, using encryption techniques and secure storage methods for passwords.</a:t>
-            </a:r>
-            <a:endParaRPr lang="en-US" sz="2400">
-              <a:cs typeface="Calibri" panose="020F0502020204030204"/>
-            </a:endParaRPr>
-          </a:p>
           <a:p>
             <a:pPr marL="0" indent="0">
               <a:buNone/>
             </a:pPr>
             <a:br>
-              <a:rPr lang="en-US" dirty="0"/>
+              <a:rPr lang="en-US" sz="4000" dirty="0"/>
             </a:br>
-            <a:endParaRPr lang="en-US"/>
+            <a:endParaRPr lang="en-US" sz="800" dirty="0"/>
           </a:p>
         </p:txBody>
       </p:sp>
@@ -8136,10 +9445,1063 @@
           </a:fontRef>
         </p:style>
       </p:sp>
+      <p:graphicFrame>
+        <p:nvGraphicFramePr>
+          <p:cNvPr id="4" name="Table 3">
+            <a:extLst>
+              <a:ext uri="{FF2B5EF4-FFF2-40B4-BE49-F238E27FC236}">
+                <a16:creationId xmlns:a16="http://schemas.microsoft.com/office/drawing/2014/main" id="{33757415-77DF-9814-0069-FA602730802B}"/>
+              </a:ext>
+            </a:extLst>
+          </p:cNvPr>
+          <p:cNvGraphicFramePr>
+            <a:graphicFrameLocks noGrp="1"/>
+          </p:cNvGraphicFramePr>
+          <p:nvPr>
+            <p:extLst>
+              <p:ext uri="{D42A27DB-BD31-4B8C-83A1-F6EECF244321}">
+                <p14:modId xmlns:p14="http://schemas.microsoft.com/office/powerpoint/2010/main" val="2495833311"/>
+              </p:ext>
+            </p:extLst>
+          </p:nvPr>
+        </p:nvGraphicFramePr>
+        <p:xfrm>
+          <a:off x="4345347" y="807723"/>
+          <a:ext cx="6266081" cy="4899520"/>
+        </p:xfrm>
+        <a:graphic>
+          <a:graphicData uri="http://schemas.openxmlformats.org/drawingml/2006/table">
+            <a:tbl>
+              <a:tblPr firstRow="1" firstCol="1" bandRow="1">
+                <a:tableStyleId>{5C22544A-7EE6-4342-B048-85BDC9FD1C3A}</a:tableStyleId>
+              </a:tblPr>
+              <a:tblGrid>
+                <a:gridCol w="2054739">
+                  <a:extLst>
+                    <a:ext uri="{9D8B030D-6E8A-4147-A177-3AD203B41FA5}">
+                      <a16:colId xmlns:a16="http://schemas.microsoft.com/office/drawing/2014/main" val="508262743"/>
+                    </a:ext>
+                  </a:extLst>
+                </a:gridCol>
+                <a:gridCol w="2255119">
+                  <a:extLst>
+                    <a:ext uri="{9D8B030D-6E8A-4147-A177-3AD203B41FA5}">
+                      <a16:colId xmlns:a16="http://schemas.microsoft.com/office/drawing/2014/main" val="95428261"/>
+                    </a:ext>
+                  </a:extLst>
+                </a:gridCol>
+                <a:gridCol w="1956223">
+                  <a:extLst>
+                    <a:ext uri="{9D8B030D-6E8A-4147-A177-3AD203B41FA5}">
+                      <a16:colId xmlns:a16="http://schemas.microsoft.com/office/drawing/2014/main" val="3051726315"/>
+                    </a:ext>
+                  </a:extLst>
+                </a:gridCol>
+              </a:tblGrid>
+              <a:tr h="489952">
+                <a:tc>
+                  <a:txBody>
+                    <a:bodyPr/>
+                    <a:lstStyle/>
+                    <a:p>
+                      <a:pPr marL="0" marR="0" algn="just">
+                        <a:lnSpc>
+                          <a:spcPct val="115000"/>
+                        </a:lnSpc>
+                        <a:spcBef>
+                          <a:spcPts val="0"/>
+                        </a:spcBef>
+                        <a:spcAft>
+                          <a:spcPts val="0"/>
+                        </a:spcAft>
+                      </a:pPr>
+                      <a:r>
+                        <a:rPr lang="en-US" sz="2000" b="1">
+                          <a:effectLst/>
+                        </a:rPr>
+                        <a:t>• Test case 1</a:t>
+                      </a:r>
+                      <a:endParaRPr lang="en-US" sz="2000" b="1">
+                        <a:effectLst/>
+                        <a:latin typeface="Arial" panose="020B0604020202020204" pitchFamily="34" charset="0"/>
+                        <a:ea typeface="Arial" panose="020B0604020202020204" pitchFamily="34" charset="0"/>
+                      </a:endParaRPr>
+                    </a:p>
+                  </a:txBody>
+                  <a:tcPr marL="68580" marR="68580" marT="0" marB="0"/>
+                </a:tc>
+                <a:tc>
+                  <a:txBody>
+                    <a:bodyPr/>
+                    <a:lstStyle/>
+                    <a:p>
+                      <a:pPr marL="0" marR="0" algn="just">
+                        <a:lnSpc>
+                          <a:spcPct val="115000"/>
+                        </a:lnSpc>
+                        <a:spcBef>
+                          <a:spcPts val="0"/>
+                        </a:spcBef>
+                        <a:spcAft>
+                          <a:spcPts val="0"/>
+                        </a:spcAft>
+                      </a:pPr>
+                      <a:r>
+                        <a:rPr lang="en-US" sz="2000" b="1">
+                          <a:effectLst/>
+                        </a:rPr>
+                        <a:t> Create policy</a:t>
+                      </a:r>
+                      <a:endParaRPr lang="en-US" sz="2000" b="1">
+                        <a:effectLst/>
+                        <a:latin typeface="Arial" panose="020B0604020202020204" pitchFamily="34" charset="0"/>
+                        <a:ea typeface="Arial" panose="020B0604020202020204" pitchFamily="34" charset="0"/>
+                      </a:endParaRPr>
+                    </a:p>
+                  </a:txBody>
+                  <a:tcPr marL="68580" marR="68580" marT="0" marB="0"/>
+                </a:tc>
+                <a:tc>
+                  <a:txBody>
+                    <a:bodyPr/>
+                    <a:lstStyle/>
+                    <a:p>
+                      <a:pPr marL="0" marR="0" algn="just">
+                        <a:lnSpc>
+                          <a:spcPct val="115000"/>
+                        </a:lnSpc>
+                        <a:spcBef>
+                          <a:spcPts val="0"/>
+                        </a:spcBef>
+                        <a:spcAft>
+                          <a:spcPts val="0"/>
+                        </a:spcAft>
+                      </a:pPr>
+                      <a:r>
+                        <a:rPr lang="en-US" sz="2000" b="1">
+                          <a:effectLst/>
+                        </a:rPr>
+                        <a:t>Passed</a:t>
+                      </a:r>
+                      <a:endParaRPr lang="en-US" sz="2000" b="1">
+                        <a:effectLst/>
+                        <a:latin typeface="Arial" panose="020B0604020202020204" pitchFamily="34" charset="0"/>
+                        <a:ea typeface="Arial" panose="020B0604020202020204" pitchFamily="34" charset="0"/>
+                      </a:endParaRPr>
+                    </a:p>
+                  </a:txBody>
+                  <a:tcPr marL="68580" marR="68580" marT="0" marB="0"/>
+                </a:tc>
+                <a:extLst>
+                  <a:ext uri="{0D108BD9-81ED-4DB2-BD59-A6C34878D82A}">
+                    <a16:rowId xmlns:a16="http://schemas.microsoft.com/office/drawing/2014/main" val="3062706409"/>
+                  </a:ext>
+                </a:extLst>
+              </a:tr>
+              <a:tr h="489952">
+                <a:tc>
+                  <a:txBody>
+                    <a:bodyPr/>
+                    <a:lstStyle/>
+                    <a:p>
+                      <a:pPr marL="0" marR="0" algn="just">
+                        <a:lnSpc>
+                          <a:spcPct val="115000"/>
+                        </a:lnSpc>
+                        <a:spcBef>
+                          <a:spcPts val="0"/>
+                        </a:spcBef>
+                        <a:spcAft>
+                          <a:spcPts val="0"/>
+                        </a:spcAft>
+                      </a:pPr>
+                      <a:r>
+                        <a:rPr lang="en-US" sz="2000" b="1" dirty="0">
+                          <a:effectLst/>
+                        </a:rPr>
+                        <a:t>• Test case 2</a:t>
+                      </a:r>
+                      <a:endParaRPr lang="en-US" sz="2000" b="1" dirty="0">
+                        <a:effectLst/>
+                        <a:latin typeface="Arial" panose="020B0604020202020204" pitchFamily="34" charset="0"/>
+                        <a:ea typeface="Arial" panose="020B0604020202020204" pitchFamily="34" charset="0"/>
+                      </a:endParaRPr>
+                    </a:p>
+                  </a:txBody>
+                  <a:tcPr marL="68580" marR="68580" marT="0" marB="0"/>
+                </a:tc>
+                <a:tc>
+                  <a:txBody>
+                    <a:bodyPr/>
+                    <a:lstStyle/>
+                    <a:p>
+                      <a:pPr marL="0" marR="0" algn="just">
+                        <a:lnSpc>
+                          <a:spcPct val="115000"/>
+                        </a:lnSpc>
+                        <a:spcBef>
+                          <a:spcPts val="0"/>
+                        </a:spcBef>
+                        <a:spcAft>
+                          <a:spcPts val="0"/>
+                        </a:spcAft>
+                      </a:pPr>
+                      <a:r>
+                        <a:rPr lang="en-US" sz="2000" b="1">
+                          <a:effectLst/>
+                        </a:rPr>
+                        <a:t> View/Search policy</a:t>
+                      </a:r>
+                      <a:endParaRPr lang="en-US" sz="2000" b="1">
+                        <a:effectLst/>
+                        <a:latin typeface="Arial" panose="020B0604020202020204" pitchFamily="34" charset="0"/>
+                        <a:ea typeface="Arial" panose="020B0604020202020204" pitchFamily="34" charset="0"/>
+                      </a:endParaRPr>
+                    </a:p>
+                  </a:txBody>
+                  <a:tcPr marL="68580" marR="68580" marT="0" marB="0"/>
+                </a:tc>
+                <a:tc>
+                  <a:txBody>
+                    <a:bodyPr/>
+                    <a:lstStyle/>
+                    <a:p>
+                      <a:pPr marL="0" marR="0" algn="just">
+                        <a:lnSpc>
+                          <a:spcPct val="115000"/>
+                        </a:lnSpc>
+                        <a:spcBef>
+                          <a:spcPts val="0"/>
+                        </a:spcBef>
+                        <a:spcAft>
+                          <a:spcPts val="0"/>
+                        </a:spcAft>
+                      </a:pPr>
+                      <a:r>
+                        <a:rPr lang="en-US" sz="2000" b="1">
+                          <a:effectLst/>
+                        </a:rPr>
+                        <a:t>Passed</a:t>
+                      </a:r>
+                      <a:endParaRPr lang="en-US" sz="2000" b="1">
+                        <a:effectLst/>
+                        <a:latin typeface="Arial" panose="020B0604020202020204" pitchFamily="34" charset="0"/>
+                        <a:ea typeface="Arial" panose="020B0604020202020204" pitchFamily="34" charset="0"/>
+                      </a:endParaRPr>
+                    </a:p>
+                  </a:txBody>
+                  <a:tcPr marL="68580" marR="68580" marT="0" marB="0"/>
+                </a:tc>
+                <a:extLst>
+                  <a:ext uri="{0D108BD9-81ED-4DB2-BD59-A6C34878D82A}">
+                    <a16:rowId xmlns:a16="http://schemas.microsoft.com/office/drawing/2014/main" val="810498082"/>
+                  </a:ext>
+                </a:extLst>
+              </a:tr>
+              <a:tr h="489952">
+                <a:tc>
+                  <a:txBody>
+                    <a:bodyPr/>
+                    <a:lstStyle/>
+                    <a:p>
+                      <a:pPr marL="0" marR="0" algn="just">
+                        <a:lnSpc>
+                          <a:spcPct val="115000"/>
+                        </a:lnSpc>
+                        <a:spcBef>
+                          <a:spcPts val="0"/>
+                        </a:spcBef>
+                        <a:spcAft>
+                          <a:spcPts val="0"/>
+                        </a:spcAft>
+                      </a:pPr>
+                      <a:r>
+                        <a:rPr lang="en-US" sz="2000" b="1">
+                          <a:effectLst/>
+                        </a:rPr>
+                        <a:t>• Test case 3</a:t>
+                      </a:r>
+                      <a:endParaRPr lang="en-US" sz="2000" b="1">
+                        <a:effectLst/>
+                        <a:latin typeface="Arial" panose="020B0604020202020204" pitchFamily="34" charset="0"/>
+                        <a:ea typeface="Arial" panose="020B0604020202020204" pitchFamily="34" charset="0"/>
+                      </a:endParaRPr>
+                    </a:p>
+                  </a:txBody>
+                  <a:tcPr marL="68580" marR="68580" marT="0" marB="0"/>
+                </a:tc>
+                <a:tc>
+                  <a:txBody>
+                    <a:bodyPr/>
+                    <a:lstStyle/>
+                    <a:p>
+                      <a:pPr marL="0" marR="0" algn="just">
+                        <a:lnSpc>
+                          <a:spcPct val="115000"/>
+                        </a:lnSpc>
+                        <a:spcBef>
+                          <a:spcPts val="0"/>
+                        </a:spcBef>
+                        <a:spcAft>
+                          <a:spcPts val="0"/>
+                        </a:spcAft>
+                      </a:pPr>
+                      <a:r>
+                        <a:rPr lang="en-US" sz="2000" b="1">
+                          <a:effectLst/>
+                        </a:rPr>
+                        <a:t> Update policy</a:t>
+                      </a:r>
+                      <a:endParaRPr lang="en-US" sz="2000" b="1">
+                        <a:effectLst/>
+                        <a:latin typeface="Arial" panose="020B0604020202020204" pitchFamily="34" charset="0"/>
+                        <a:ea typeface="Arial" panose="020B0604020202020204" pitchFamily="34" charset="0"/>
+                      </a:endParaRPr>
+                    </a:p>
+                  </a:txBody>
+                  <a:tcPr marL="68580" marR="68580" marT="0" marB="0"/>
+                </a:tc>
+                <a:tc>
+                  <a:txBody>
+                    <a:bodyPr/>
+                    <a:lstStyle/>
+                    <a:p>
+                      <a:pPr marL="0" marR="0" algn="just">
+                        <a:lnSpc>
+                          <a:spcPct val="115000"/>
+                        </a:lnSpc>
+                        <a:spcBef>
+                          <a:spcPts val="0"/>
+                        </a:spcBef>
+                        <a:spcAft>
+                          <a:spcPts val="0"/>
+                        </a:spcAft>
+                      </a:pPr>
+                      <a:r>
+                        <a:rPr lang="en-US" sz="2000" b="1">
+                          <a:effectLst/>
+                        </a:rPr>
+                        <a:t>Passed</a:t>
+                      </a:r>
+                      <a:endParaRPr lang="en-US" sz="2000" b="1">
+                        <a:effectLst/>
+                        <a:latin typeface="Arial" panose="020B0604020202020204" pitchFamily="34" charset="0"/>
+                        <a:ea typeface="Arial" panose="020B0604020202020204" pitchFamily="34" charset="0"/>
+                      </a:endParaRPr>
+                    </a:p>
+                  </a:txBody>
+                  <a:tcPr marL="68580" marR="68580" marT="0" marB="0"/>
+                </a:tc>
+                <a:extLst>
+                  <a:ext uri="{0D108BD9-81ED-4DB2-BD59-A6C34878D82A}">
+                    <a16:rowId xmlns:a16="http://schemas.microsoft.com/office/drawing/2014/main" val="220392596"/>
+                  </a:ext>
+                </a:extLst>
+              </a:tr>
+              <a:tr h="489952">
+                <a:tc>
+                  <a:txBody>
+                    <a:bodyPr/>
+                    <a:lstStyle/>
+                    <a:p>
+                      <a:pPr marL="0" marR="0" algn="just">
+                        <a:lnSpc>
+                          <a:spcPct val="115000"/>
+                        </a:lnSpc>
+                        <a:spcBef>
+                          <a:spcPts val="0"/>
+                        </a:spcBef>
+                        <a:spcAft>
+                          <a:spcPts val="0"/>
+                        </a:spcAft>
+                      </a:pPr>
+                      <a:r>
+                        <a:rPr lang="en-US" sz="2000" b="1">
+                          <a:effectLst/>
+                        </a:rPr>
+                        <a:t>• Test case 4</a:t>
+                      </a:r>
+                      <a:endParaRPr lang="en-US" sz="2000" b="1">
+                        <a:effectLst/>
+                        <a:latin typeface="Arial" panose="020B0604020202020204" pitchFamily="34" charset="0"/>
+                        <a:ea typeface="Arial" panose="020B0604020202020204" pitchFamily="34" charset="0"/>
+                      </a:endParaRPr>
+                    </a:p>
+                  </a:txBody>
+                  <a:tcPr marL="68580" marR="68580" marT="0" marB="0"/>
+                </a:tc>
+                <a:tc>
+                  <a:txBody>
+                    <a:bodyPr/>
+                    <a:lstStyle/>
+                    <a:p>
+                      <a:pPr marL="0" marR="0" algn="just">
+                        <a:lnSpc>
+                          <a:spcPct val="115000"/>
+                        </a:lnSpc>
+                        <a:spcBef>
+                          <a:spcPts val="0"/>
+                        </a:spcBef>
+                        <a:spcAft>
+                          <a:spcPts val="0"/>
+                        </a:spcAft>
+                      </a:pPr>
+                      <a:r>
+                        <a:rPr lang="en-US" sz="2000" b="1">
+                          <a:effectLst/>
+                        </a:rPr>
+                        <a:t> Delete policy</a:t>
+                      </a:r>
+                      <a:endParaRPr lang="en-US" sz="2000" b="1">
+                        <a:effectLst/>
+                        <a:latin typeface="Arial" panose="020B0604020202020204" pitchFamily="34" charset="0"/>
+                        <a:ea typeface="Arial" panose="020B0604020202020204" pitchFamily="34" charset="0"/>
+                      </a:endParaRPr>
+                    </a:p>
+                  </a:txBody>
+                  <a:tcPr marL="68580" marR="68580" marT="0" marB="0"/>
+                </a:tc>
+                <a:tc>
+                  <a:txBody>
+                    <a:bodyPr/>
+                    <a:lstStyle/>
+                    <a:p>
+                      <a:pPr marL="0" marR="0" algn="just">
+                        <a:lnSpc>
+                          <a:spcPct val="115000"/>
+                        </a:lnSpc>
+                        <a:spcBef>
+                          <a:spcPts val="0"/>
+                        </a:spcBef>
+                        <a:spcAft>
+                          <a:spcPts val="0"/>
+                        </a:spcAft>
+                      </a:pPr>
+                      <a:r>
+                        <a:rPr lang="en-US" sz="2000" b="1">
+                          <a:effectLst/>
+                        </a:rPr>
+                        <a:t>Passed</a:t>
+                      </a:r>
+                      <a:endParaRPr lang="en-US" sz="2000" b="1">
+                        <a:effectLst/>
+                        <a:latin typeface="Arial" panose="020B0604020202020204" pitchFamily="34" charset="0"/>
+                        <a:ea typeface="Arial" panose="020B0604020202020204" pitchFamily="34" charset="0"/>
+                      </a:endParaRPr>
+                    </a:p>
+                  </a:txBody>
+                  <a:tcPr marL="68580" marR="68580" marT="0" marB="0"/>
+                </a:tc>
+                <a:extLst>
+                  <a:ext uri="{0D108BD9-81ED-4DB2-BD59-A6C34878D82A}">
+                    <a16:rowId xmlns:a16="http://schemas.microsoft.com/office/drawing/2014/main" val="332983844"/>
+                  </a:ext>
+                </a:extLst>
+              </a:tr>
+              <a:tr h="489952">
+                <a:tc>
+                  <a:txBody>
+                    <a:bodyPr/>
+                    <a:lstStyle/>
+                    <a:p>
+                      <a:pPr marL="0" marR="0" algn="just">
+                        <a:lnSpc>
+                          <a:spcPct val="115000"/>
+                        </a:lnSpc>
+                        <a:spcBef>
+                          <a:spcPts val="0"/>
+                        </a:spcBef>
+                        <a:spcAft>
+                          <a:spcPts val="0"/>
+                        </a:spcAft>
+                      </a:pPr>
+                      <a:r>
+                        <a:rPr lang="en-US" sz="2000" b="1">
+                          <a:effectLst/>
+                        </a:rPr>
+                        <a:t>• Test case 9</a:t>
+                      </a:r>
+                      <a:endParaRPr lang="en-US" sz="2000" b="1">
+                        <a:effectLst/>
+                        <a:latin typeface="Arial" panose="020B0604020202020204" pitchFamily="34" charset="0"/>
+                        <a:ea typeface="Arial" panose="020B0604020202020204" pitchFamily="34" charset="0"/>
+                      </a:endParaRPr>
+                    </a:p>
+                  </a:txBody>
+                  <a:tcPr marL="68580" marR="68580" marT="0" marB="0"/>
+                </a:tc>
+                <a:tc>
+                  <a:txBody>
+                    <a:bodyPr/>
+                    <a:lstStyle/>
+                    <a:p>
+                      <a:pPr marL="0" marR="0" algn="just">
+                        <a:lnSpc>
+                          <a:spcPct val="115000"/>
+                        </a:lnSpc>
+                        <a:spcBef>
+                          <a:spcPts val="0"/>
+                        </a:spcBef>
+                        <a:spcAft>
+                          <a:spcPts val="0"/>
+                        </a:spcAft>
+                      </a:pPr>
+                      <a:r>
+                        <a:rPr lang="en-US" sz="2000" b="1">
+                          <a:effectLst/>
+                        </a:rPr>
+                        <a:t> View premium</a:t>
+                      </a:r>
+                      <a:endParaRPr lang="en-US" sz="2000" b="1">
+                        <a:effectLst/>
+                        <a:latin typeface="Arial" panose="020B0604020202020204" pitchFamily="34" charset="0"/>
+                        <a:ea typeface="Arial" panose="020B0604020202020204" pitchFamily="34" charset="0"/>
+                      </a:endParaRPr>
+                    </a:p>
+                  </a:txBody>
+                  <a:tcPr marL="68580" marR="68580" marT="0" marB="0"/>
+                </a:tc>
+                <a:tc>
+                  <a:txBody>
+                    <a:bodyPr/>
+                    <a:lstStyle/>
+                    <a:p>
+                      <a:pPr marL="0" marR="0" algn="just">
+                        <a:lnSpc>
+                          <a:spcPct val="115000"/>
+                        </a:lnSpc>
+                        <a:spcBef>
+                          <a:spcPts val="0"/>
+                        </a:spcBef>
+                        <a:spcAft>
+                          <a:spcPts val="0"/>
+                        </a:spcAft>
+                      </a:pPr>
+                      <a:r>
+                        <a:rPr lang="en-US" sz="2000" b="1">
+                          <a:effectLst/>
+                        </a:rPr>
+                        <a:t>Passed</a:t>
+                      </a:r>
+                      <a:endParaRPr lang="en-US" sz="2000" b="1">
+                        <a:effectLst/>
+                        <a:latin typeface="Arial" panose="020B0604020202020204" pitchFamily="34" charset="0"/>
+                        <a:ea typeface="Arial" panose="020B0604020202020204" pitchFamily="34" charset="0"/>
+                      </a:endParaRPr>
+                    </a:p>
+                  </a:txBody>
+                  <a:tcPr marL="68580" marR="68580" marT="0" marB="0"/>
+                </a:tc>
+                <a:extLst>
+                  <a:ext uri="{0D108BD9-81ED-4DB2-BD59-A6C34878D82A}">
+                    <a16:rowId xmlns:a16="http://schemas.microsoft.com/office/drawing/2014/main" val="1986459270"/>
+                  </a:ext>
+                </a:extLst>
+              </a:tr>
+              <a:tr h="489952">
+                <a:tc>
+                  <a:txBody>
+                    <a:bodyPr/>
+                    <a:lstStyle/>
+                    <a:p>
+                      <a:pPr marL="0" marR="0" algn="just">
+                        <a:lnSpc>
+                          <a:spcPct val="115000"/>
+                        </a:lnSpc>
+                        <a:spcBef>
+                          <a:spcPts val="0"/>
+                        </a:spcBef>
+                        <a:spcAft>
+                          <a:spcPts val="0"/>
+                        </a:spcAft>
+                      </a:pPr>
+                      <a:r>
+                        <a:rPr lang="en-US" sz="2000" b="1">
+                          <a:effectLst/>
+                        </a:rPr>
+                        <a:t>• Test case 10</a:t>
+                      </a:r>
+                      <a:endParaRPr lang="en-US" sz="2000" b="1">
+                        <a:effectLst/>
+                        <a:latin typeface="Arial" panose="020B0604020202020204" pitchFamily="34" charset="0"/>
+                        <a:ea typeface="Arial" panose="020B0604020202020204" pitchFamily="34" charset="0"/>
+                      </a:endParaRPr>
+                    </a:p>
+                  </a:txBody>
+                  <a:tcPr marL="68580" marR="68580" marT="0" marB="0"/>
+                </a:tc>
+                <a:tc>
+                  <a:txBody>
+                    <a:bodyPr/>
+                    <a:lstStyle/>
+                    <a:p>
+                      <a:pPr marL="0" marR="0" algn="just">
+                        <a:lnSpc>
+                          <a:spcPct val="115000"/>
+                        </a:lnSpc>
+                        <a:spcBef>
+                          <a:spcPts val="0"/>
+                        </a:spcBef>
+                        <a:spcAft>
+                          <a:spcPts val="0"/>
+                        </a:spcAft>
+                      </a:pPr>
+                      <a:r>
+                        <a:rPr lang="en-US" sz="2000" b="1">
+                          <a:effectLst/>
+                        </a:rPr>
+                        <a:t> Update premium</a:t>
+                      </a:r>
+                      <a:endParaRPr lang="en-US" sz="2000" b="1">
+                        <a:effectLst/>
+                        <a:latin typeface="Arial" panose="020B0604020202020204" pitchFamily="34" charset="0"/>
+                        <a:ea typeface="Arial" panose="020B0604020202020204" pitchFamily="34" charset="0"/>
+                      </a:endParaRPr>
+                    </a:p>
+                  </a:txBody>
+                  <a:tcPr marL="68580" marR="68580" marT="0" marB="0"/>
+                </a:tc>
+                <a:tc>
+                  <a:txBody>
+                    <a:bodyPr/>
+                    <a:lstStyle/>
+                    <a:p>
+                      <a:pPr marL="0" marR="0" algn="just">
+                        <a:lnSpc>
+                          <a:spcPct val="115000"/>
+                        </a:lnSpc>
+                        <a:spcBef>
+                          <a:spcPts val="0"/>
+                        </a:spcBef>
+                        <a:spcAft>
+                          <a:spcPts val="0"/>
+                        </a:spcAft>
+                      </a:pPr>
+                      <a:r>
+                        <a:rPr lang="en-US" sz="2000" b="1">
+                          <a:effectLst/>
+                        </a:rPr>
+                        <a:t>Passed</a:t>
+                      </a:r>
+                      <a:endParaRPr lang="en-US" sz="2000" b="1">
+                        <a:effectLst/>
+                        <a:latin typeface="Arial" panose="020B0604020202020204" pitchFamily="34" charset="0"/>
+                        <a:ea typeface="Arial" panose="020B0604020202020204" pitchFamily="34" charset="0"/>
+                      </a:endParaRPr>
+                    </a:p>
+                  </a:txBody>
+                  <a:tcPr marL="68580" marR="68580" marT="0" marB="0"/>
+                </a:tc>
+                <a:extLst>
+                  <a:ext uri="{0D108BD9-81ED-4DB2-BD59-A6C34878D82A}">
+                    <a16:rowId xmlns:a16="http://schemas.microsoft.com/office/drawing/2014/main" val="3338814631"/>
+                  </a:ext>
+                </a:extLst>
+              </a:tr>
+              <a:tr h="489952">
+                <a:tc>
+                  <a:txBody>
+                    <a:bodyPr/>
+                    <a:lstStyle/>
+                    <a:p>
+                      <a:pPr marL="0" marR="0" algn="just">
+                        <a:lnSpc>
+                          <a:spcPct val="115000"/>
+                        </a:lnSpc>
+                        <a:spcBef>
+                          <a:spcPts val="0"/>
+                        </a:spcBef>
+                        <a:spcAft>
+                          <a:spcPts val="0"/>
+                        </a:spcAft>
+                      </a:pPr>
+                      <a:r>
+                        <a:rPr lang="en-US" sz="2000" b="1">
+                          <a:effectLst/>
+                        </a:rPr>
+                        <a:t>• Test case 13</a:t>
+                      </a:r>
+                      <a:endParaRPr lang="en-US" sz="2000" b="1">
+                        <a:effectLst/>
+                        <a:latin typeface="Arial" panose="020B0604020202020204" pitchFamily="34" charset="0"/>
+                        <a:ea typeface="Arial" panose="020B0604020202020204" pitchFamily="34" charset="0"/>
+                      </a:endParaRPr>
+                    </a:p>
+                  </a:txBody>
+                  <a:tcPr marL="68580" marR="68580" marT="0" marB="0"/>
+                </a:tc>
+                <a:tc>
+                  <a:txBody>
+                    <a:bodyPr/>
+                    <a:lstStyle/>
+                    <a:p>
+                      <a:pPr marL="0" marR="0" algn="just">
+                        <a:lnSpc>
+                          <a:spcPct val="115000"/>
+                        </a:lnSpc>
+                        <a:spcBef>
+                          <a:spcPts val="0"/>
+                        </a:spcBef>
+                        <a:spcAft>
+                          <a:spcPts val="0"/>
+                        </a:spcAft>
+                      </a:pPr>
+                      <a:r>
+                        <a:rPr lang="en-US" sz="2000" b="1">
+                          <a:effectLst/>
+                        </a:rPr>
+                        <a:t> Create user</a:t>
+                      </a:r>
+                      <a:endParaRPr lang="en-US" sz="2000" b="1">
+                        <a:effectLst/>
+                        <a:latin typeface="Arial" panose="020B0604020202020204" pitchFamily="34" charset="0"/>
+                        <a:ea typeface="Arial" panose="020B0604020202020204" pitchFamily="34" charset="0"/>
+                      </a:endParaRPr>
+                    </a:p>
+                  </a:txBody>
+                  <a:tcPr marL="68580" marR="68580" marT="0" marB="0"/>
+                </a:tc>
+                <a:tc>
+                  <a:txBody>
+                    <a:bodyPr/>
+                    <a:lstStyle/>
+                    <a:p>
+                      <a:pPr marL="0" marR="0" algn="just">
+                        <a:lnSpc>
+                          <a:spcPct val="115000"/>
+                        </a:lnSpc>
+                        <a:spcBef>
+                          <a:spcPts val="0"/>
+                        </a:spcBef>
+                        <a:spcAft>
+                          <a:spcPts val="0"/>
+                        </a:spcAft>
+                      </a:pPr>
+                      <a:r>
+                        <a:rPr lang="en-US" sz="2000" b="1">
+                          <a:effectLst/>
+                        </a:rPr>
+                        <a:t>Passed</a:t>
+                      </a:r>
+                      <a:endParaRPr lang="en-US" sz="2000" b="1">
+                        <a:effectLst/>
+                        <a:latin typeface="Arial" panose="020B0604020202020204" pitchFamily="34" charset="0"/>
+                        <a:ea typeface="Arial" panose="020B0604020202020204" pitchFamily="34" charset="0"/>
+                      </a:endParaRPr>
+                    </a:p>
+                  </a:txBody>
+                  <a:tcPr marL="68580" marR="68580" marT="0" marB="0"/>
+                </a:tc>
+                <a:extLst>
+                  <a:ext uri="{0D108BD9-81ED-4DB2-BD59-A6C34878D82A}">
+                    <a16:rowId xmlns:a16="http://schemas.microsoft.com/office/drawing/2014/main" val="2924995720"/>
+                  </a:ext>
+                </a:extLst>
+              </a:tr>
+              <a:tr h="489952">
+                <a:tc>
+                  <a:txBody>
+                    <a:bodyPr/>
+                    <a:lstStyle/>
+                    <a:p>
+                      <a:pPr marL="0" marR="0" algn="just">
+                        <a:lnSpc>
+                          <a:spcPct val="115000"/>
+                        </a:lnSpc>
+                        <a:spcBef>
+                          <a:spcPts val="0"/>
+                        </a:spcBef>
+                        <a:spcAft>
+                          <a:spcPts val="0"/>
+                        </a:spcAft>
+                      </a:pPr>
+                      <a:r>
+                        <a:rPr lang="en-US" sz="2000" b="1">
+                          <a:effectLst/>
+                        </a:rPr>
+                        <a:t>• Test case 14</a:t>
+                      </a:r>
+                      <a:endParaRPr lang="en-US" sz="2000" b="1">
+                        <a:effectLst/>
+                        <a:latin typeface="Arial" panose="020B0604020202020204" pitchFamily="34" charset="0"/>
+                        <a:ea typeface="Arial" panose="020B0604020202020204" pitchFamily="34" charset="0"/>
+                      </a:endParaRPr>
+                    </a:p>
+                  </a:txBody>
+                  <a:tcPr marL="68580" marR="68580" marT="0" marB="0"/>
+                </a:tc>
+                <a:tc>
+                  <a:txBody>
+                    <a:bodyPr/>
+                    <a:lstStyle/>
+                    <a:p>
+                      <a:pPr marL="0" marR="0" algn="just">
+                        <a:lnSpc>
+                          <a:spcPct val="115000"/>
+                        </a:lnSpc>
+                        <a:spcBef>
+                          <a:spcPts val="0"/>
+                        </a:spcBef>
+                        <a:spcAft>
+                          <a:spcPts val="0"/>
+                        </a:spcAft>
+                      </a:pPr>
+                      <a:r>
+                        <a:rPr lang="en-US" sz="2000" b="1">
+                          <a:effectLst/>
+                        </a:rPr>
+                        <a:t> Update user</a:t>
+                      </a:r>
+                      <a:endParaRPr lang="en-US" sz="2000" b="1">
+                        <a:effectLst/>
+                        <a:latin typeface="Arial" panose="020B0604020202020204" pitchFamily="34" charset="0"/>
+                        <a:ea typeface="Arial" panose="020B0604020202020204" pitchFamily="34" charset="0"/>
+                      </a:endParaRPr>
+                    </a:p>
+                  </a:txBody>
+                  <a:tcPr marL="68580" marR="68580" marT="0" marB="0"/>
+                </a:tc>
+                <a:tc>
+                  <a:txBody>
+                    <a:bodyPr/>
+                    <a:lstStyle/>
+                    <a:p>
+                      <a:pPr marL="0" marR="0" algn="just">
+                        <a:lnSpc>
+                          <a:spcPct val="115000"/>
+                        </a:lnSpc>
+                        <a:spcBef>
+                          <a:spcPts val="0"/>
+                        </a:spcBef>
+                        <a:spcAft>
+                          <a:spcPts val="0"/>
+                        </a:spcAft>
+                      </a:pPr>
+                      <a:r>
+                        <a:rPr lang="en-US" sz="2000" b="1">
+                          <a:effectLst/>
+                        </a:rPr>
+                        <a:t>Passed</a:t>
+                      </a:r>
+                      <a:endParaRPr lang="en-US" sz="2000" b="1">
+                        <a:effectLst/>
+                        <a:latin typeface="Arial" panose="020B0604020202020204" pitchFamily="34" charset="0"/>
+                        <a:ea typeface="Arial" panose="020B0604020202020204" pitchFamily="34" charset="0"/>
+                      </a:endParaRPr>
+                    </a:p>
+                  </a:txBody>
+                  <a:tcPr marL="68580" marR="68580" marT="0" marB="0"/>
+                </a:tc>
+                <a:extLst>
+                  <a:ext uri="{0D108BD9-81ED-4DB2-BD59-A6C34878D82A}">
+                    <a16:rowId xmlns:a16="http://schemas.microsoft.com/office/drawing/2014/main" val="1500537246"/>
+                  </a:ext>
+                </a:extLst>
+              </a:tr>
+              <a:tr h="489952">
+                <a:tc>
+                  <a:txBody>
+                    <a:bodyPr/>
+                    <a:lstStyle/>
+                    <a:p>
+                      <a:pPr marL="0" marR="0" algn="just">
+                        <a:lnSpc>
+                          <a:spcPct val="115000"/>
+                        </a:lnSpc>
+                        <a:spcBef>
+                          <a:spcPts val="0"/>
+                        </a:spcBef>
+                        <a:spcAft>
+                          <a:spcPts val="0"/>
+                        </a:spcAft>
+                      </a:pPr>
+                      <a:r>
+                        <a:rPr lang="en-US" sz="2000" b="1">
+                          <a:effectLst/>
+                        </a:rPr>
+                        <a:t>• Test case 15</a:t>
+                      </a:r>
+                      <a:endParaRPr lang="en-US" sz="2000" b="1">
+                        <a:effectLst/>
+                        <a:latin typeface="Arial" panose="020B0604020202020204" pitchFamily="34" charset="0"/>
+                        <a:ea typeface="Arial" panose="020B0604020202020204" pitchFamily="34" charset="0"/>
+                      </a:endParaRPr>
+                    </a:p>
+                  </a:txBody>
+                  <a:tcPr marL="68580" marR="68580" marT="0" marB="0"/>
+                </a:tc>
+                <a:tc>
+                  <a:txBody>
+                    <a:bodyPr/>
+                    <a:lstStyle/>
+                    <a:p>
+                      <a:pPr marL="0" marR="0" algn="just">
+                        <a:lnSpc>
+                          <a:spcPct val="115000"/>
+                        </a:lnSpc>
+                        <a:spcBef>
+                          <a:spcPts val="0"/>
+                        </a:spcBef>
+                        <a:spcAft>
+                          <a:spcPts val="0"/>
+                        </a:spcAft>
+                      </a:pPr>
+                      <a:r>
+                        <a:rPr lang="en-US" sz="2000" b="1">
+                          <a:effectLst/>
+                        </a:rPr>
+                        <a:t> Delete user</a:t>
+                      </a:r>
+                      <a:endParaRPr lang="en-US" sz="2000" b="1">
+                        <a:effectLst/>
+                        <a:latin typeface="Arial" panose="020B0604020202020204" pitchFamily="34" charset="0"/>
+                        <a:ea typeface="Arial" panose="020B0604020202020204" pitchFamily="34" charset="0"/>
+                      </a:endParaRPr>
+                    </a:p>
+                  </a:txBody>
+                  <a:tcPr marL="68580" marR="68580" marT="0" marB="0"/>
+                </a:tc>
+                <a:tc>
+                  <a:txBody>
+                    <a:bodyPr/>
+                    <a:lstStyle/>
+                    <a:p>
+                      <a:pPr marL="0" marR="0" algn="just">
+                        <a:lnSpc>
+                          <a:spcPct val="115000"/>
+                        </a:lnSpc>
+                        <a:spcBef>
+                          <a:spcPts val="0"/>
+                        </a:spcBef>
+                        <a:spcAft>
+                          <a:spcPts val="0"/>
+                        </a:spcAft>
+                      </a:pPr>
+                      <a:r>
+                        <a:rPr lang="en-US" sz="2000" b="1" dirty="0">
+                          <a:effectLst/>
+                        </a:rPr>
+                        <a:t>Passed</a:t>
+                      </a:r>
+                      <a:endParaRPr lang="en-US" sz="2000" b="1" dirty="0">
+                        <a:effectLst/>
+                        <a:latin typeface="Arial" panose="020B0604020202020204" pitchFamily="34" charset="0"/>
+                        <a:ea typeface="Arial" panose="020B0604020202020204" pitchFamily="34" charset="0"/>
+                      </a:endParaRPr>
+                    </a:p>
+                  </a:txBody>
+                  <a:tcPr marL="68580" marR="68580" marT="0" marB="0"/>
+                </a:tc>
+                <a:extLst>
+                  <a:ext uri="{0D108BD9-81ED-4DB2-BD59-A6C34878D82A}">
+                    <a16:rowId xmlns:a16="http://schemas.microsoft.com/office/drawing/2014/main" val="3378622866"/>
+                  </a:ext>
+                </a:extLst>
+              </a:tr>
+              <a:tr h="489952">
+                <a:tc>
+                  <a:txBody>
+                    <a:bodyPr/>
+                    <a:lstStyle/>
+                    <a:p>
+                      <a:pPr marL="0" marR="0" algn="just">
+                        <a:lnSpc>
+                          <a:spcPct val="115000"/>
+                        </a:lnSpc>
+                        <a:spcBef>
+                          <a:spcPts val="0"/>
+                        </a:spcBef>
+                        <a:spcAft>
+                          <a:spcPts val="0"/>
+                        </a:spcAft>
+                      </a:pPr>
+                      <a:endParaRPr lang="en-US" sz="2000" b="1" dirty="0">
+                        <a:effectLst/>
+                        <a:latin typeface="Arial" panose="020B0604020202020204" pitchFamily="34" charset="0"/>
+                        <a:ea typeface="Arial" panose="020B0604020202020204" pitchFamily="34" charset="0"/>
+                      </a:endParaRPr>
+                    </a:p>
+                  </a:txBody>
+                  <a:tcPr marL="68580" marR="68580" marT="0" marB="0"/>
+                </a:tc>
+                <a:tc>
+                  <a:txBody>
+                    <a:bodyPr/>
+                    <a:lstStyle/>
+                    <a:p>
+                      <a:pPr marL="0" marR="0" algn="just" defTabSz="914400" rtl="0" eaLnBrk="1" latinLnBrk="0" hangingPunct="1">
+                        <a:lnSpc>
+                          <a:spcPct val="115000"/>
+                        </a:lnSpc>
+                        <a:spcBef>
+                          <a:spcPts val="0"/>
+                        </a:spcBef>
+                        <a:spcAft>
+                          <a:spcPts val="0"/>
+                        </a:spcAft>
+                      </a:pPr>
+                      <a:r>
+                        <a:rPr lang="en-US" sz="2000" b="1" kern="1200" dirty="0">
+                          <a:solidFill>
+                            <a:schemeClr val="dk1"/>
+                          </a:solidFill>
+                          <a:effectLst/>
+                          <a:latin typeface="+mn-lt"/>
+                          <a:ea typeface="+mn-ea"/>
+                          <a:cs typeface="+mn-cs"/>
+                        </a:rPr>
+                        <a:t>Login</a:t>
+                      </a:r>
+                    </a:p>
+                  </a:txBody>
+                  <a:tcPr marL="68580" marR="68580" marT="0" marB="0"/>
+                </a:tc>
+                <a:tc>
+                  <a:txBody>
+                    <a:bodyPr/>
+                    <a:lstStyle/>
+                    <a:p>
+                      <a:pPr marL="0" marR="0" algn="just" defTabSz="914400" rtl="0" eaLnBrk="1" latinLnBrk="0" hangingPunct="1">
+                        <a:lnSpc>
+                          <a:spcPct val="115000"/>
+                        </a:lnSpc>
+                        <a:spcBef>
+                          <a:spcPts val="0"/>
+                        </a:spcBef>
+                        <a:spcAft>
+                          <a:spcPts val="0"/>
+                        </a:spcAft>
+                      </a:pPr>
+                      <a:r>
+                        <a:rPr lang="en-US" sz="2000" b="1" kern="1200" dirty="0">
+                          <a:solidFill>
+                            <a:schemeClr val="dk1"/>
+                          </a:solidFill>
+                          <a:effectLst/>
+                          <a:latin typeface="+mn-lt"/>
+                          <a:ea typeface="+mn-ea"/>
+                          <a:cs typeface="+mn-cs"/>
+                        </a:rPr>
+                        <a:t>Passed</a:t>
+                      </a:r>
+                    </a:p>
+                  </a:txBody>
+                  <a:tcPr marL="68580" marR="68580" marT="0" marB="0"/>
+                </a:tc>
+                <a:extLst>
+                  <a:ext uri="{0D108BD9-81ED-4DB2-BD59-A6C34878D82A}">
+                    <a16:rowId xmlns:a16="http://schemas.microsoft.com/office/drawing/2014/main" val="4050093977"/>
+                  </a:ext>
+                </a:extLst>
+              </a:tr>
+            </a:tbl>
+          </a:graphicData>
+        </a:graphic>
+      </p:graphicFrame>
     </p:spTree>
     <p:extLst>
       <p:ext uri="{BB962C8B-B14F-4D97-AF65-F5344CB8AC3E}">
-        <p14:creationId xmlns:p14="http://schemas.microsoft.com/office/powerpoint/2010/main" val="3473985570"/>
+        <p14:creationId xmlns:p14="http://schemas.microsoft.com/office/powerpoint/2010/main" val="3123125073"/>
       </p:ext>
     </p:extLst>
   </p:cSld>
@@ -8376,11 +10738,11 @@
           <a:lstStyle/>
           <a:p>
             <a:r>
-              <a:rPr lang="en-US">
+              <a:rPr lang="en-US" dirty="0">
                 <a:latin typeface="Arial"/>
                 <a:cs typeface="Arial"/>
               </a:rPr>
-              <a:t>Integrations</a:t>
+              <a:t>Agile Tools &amp; Techniques</a:t>
             </a:r>
             <a:endParaRPr lang="en-US" dirty="0"/>
           </a:p>
@@ -8410,89 +10772,60 @@
         </p:spPr>
         <p:txBody>
           <a:bodyPr vert="horz" lIns="91440" tIns="45720" rIns="91440" bIns="45720" rtlCol="0">
-            <a:normAutofit fontScale="92500" lnSpcReduction="10000"/>
+            <a:normAutofit/>
           </a:bodyPr>
           <a:lstStyle/>
           <a:p>
+            <a:pPr marL="0" indent="0">
+              <a:buNone/>
+            </a:pPr>
             <a:r>
               <a:rPr lang="en-US" sz="2400" dirty="0">
                 <a:latin typeface="Arial"/>
                 <a:cs typeface="Arial"/>
               </a:rPr>
-              <a:t>The Wheel Wise Insurance Management System will integrate with external systems, such as:</a:t>
-            </a:r>
-            <a:endParaRPr lang="en-US" sz="2400" dirty="0">
-              <a:latin typeface="Corbel" panose="020B0503020204020204"/>
-              <a:cs typeface="Calibri" panose="020F0502020204030204"/>
-            </a:endParaRPr>
-          </a:p>
-          <a:p>
-            <a:pPr marL="971550" lvl="1" indent="-285750"/>
-            <a:r>
-              <a:rPr lang="en-US" sz="2400" dirty="0">
+              <a:t>In the Wheel Wise Insurance Management System the following Agile tool and technique has been employed:</a:t>
+            </a:r>
+          </a:p>
+          <a:p>
+            <a:r>
+              <a:rPr lang="en-US" sz="2800" b="0" i="0" dirty="0">
+                <a:solidFill>
+                  <a:srgbClr val="D1D5DB"/>
+                </a:solidFill>
+                <a:effectLst/>
+                <a:latin typeface="Söhne"/>
+              </a:rPr>
+              <a:t>Product Backlog</a:t>
+            </a:r>
+            <a:r>
+              <a:rPr lang="en-US" sz="2800" b="0" i="0" dirty="0">
+                <a:solidFill>
+                  <a:srgbClr val="D1D5DB"/>
+                </a:solidFill>
+                <a:effectLst/>
                 <a:latin typeface="Arial"/>
                 <a:cs typeface="Arial"/>
               </a:rPr>
-              <a:t>Payment gateways (Stripe, PayPal, Braintree)</a:t>
-            </a:r>
-            <a:endParaRPr lang="en-US" sz="2400">
-              <a:latin typeface="Corbel" panose="020B0503020204020204"/>
-              <a:cs typeface="Calibri" panose="020F0502020204030204"/>
-            </a:endParaRPr>
-          </a:p>
-          <a:p>
-            <a:pPr marL="971550" lvl="1" indent="-285750"/>
-            <a:r>
-              <a:rPr lang="en-US" sz="2400" dirty="0">
-                <a:latin typeface="Arial"/>
-                <a:cs typeface="Arial"/>
+              <a:t>: </a:t>
+            </a:r>
+            <a:r>
+              <a:rPr lang="en-US" sz="2800" b="0" i="0" dirty="0">
+                <a:solidFill>
+                  <a:srgbClr val="D1D5DB"/>
+                </a:solidFill>
+                <a:effectLst/>
+                <a:latin typeface="Söhne"/>
               </a:rPr>
-              <a:t>Email services (SendGrid, </a:t>
-            </a:r>
-            <a:r>
-              <a:rPr lang="en-US" sz="2400" dirty="0" err="1">
-                <a:latin typeface="Arial"/>
-                <a:cs typeface="Arial"/>
-              </a:rPr>
-              <a:t>Mailgun</a:t>
-            </a:r>
-            <a:r>
-              <a:rPr lang="en-US" sz="2400" dirty="0">
-                <a:latin typeface="Arial"/>
-                <a:cs typeface="Arial"/>
-              </a:rPr>
-              <a:t>) to enhance functionality and user experience. </a:t>
-            </a:r>
-            <a:endParaRPr lang="en-US" sz="2400">
-              <a:latin typeface="Corbel" panose="020B0503020204020204"/>
-              <a:cs typeface="Calibri" panose="020F0502020204030204"/>
-            </a:endParaRPr>
-          </a:p>
-          <a:p>
-            <a:pPr marL="525780" indent="-342900"/>
-            <a:r>
-              <a:rPr lang="en-US" sz="2400" dirty="0">
-                <a:latin typeface="Arial"/>
-                <a:cs typeface="Arial"/>
-              </a:rPr>
-              <a:t>Secure processing of payments, efficient communication with users, and seamless data exchange are achieved through these integrations.</a:t>
-            </a:r>
-            <a:endParaRPr lang="en-US" sz="2400" dirty="0">
-              <a:latin typeface="Corbel" panose="020B0503020204020204"/>
-              <a:cs typeface="Calibri" panose="020F0502020204030204"/>
-            </a:endParaRPr>
-          </a:p>
-          <a:p>
-            <a:pPr marL="525780" indent="-342900"/>
-            <a:r>
-              <a:rPr lang="en-US" sz="2400" dirty="0">
-                <a:latin typeface="Arial"/>
-                <a:cs typeface="Arial"/>
-              </a:rPr>
-              <a:t>Authentication and authorization are managed using API keys or OAuth tokens, and data exchange is protected using SSL/TLS encryption, ensuring security and compliance with industry standards.</a:t>
-            </a:r>
-            <a:endParaRPr lang="en-US" sz="2400">
-              <a:cs typeface="Calibri" panose="020F0502020204030204"/>
+              <a:t>A prioritized list of features.</a:t>
+            </a:r>
+            <a:endParaRPr lang="en-US" sz="2800" b="0" i="0" dirty="0">
+              <a:solidFill>
+                <a:srgbClr val="D1D5DB"/>
+              </a:solidFill>
+              <a:effectLst/>
+              <a:latin typeface="Arial"/>
+              <a:cs typeface="Arial"/>
             </a:endParaRPr>
           </a:p>
           <a:p>
@@ -8812,7 +11145,7 @@
           <p:cNvPr id="2" name="Title 1">
             <a:extLst>
               <a:ext uri="{FF2B5EF4-FFF2-40B4-BE49-F238E27FC236}">
-                <a16:creationId xmlns:a16="http://schemas.microsoft.com/office/drawing/2014/main" id="{96E2743E-97B5-54DB-AC50-DE4F7B6B5F01}"/>
+                <a16:creationId xmlns:a16="http://schemas.microsoft.com/office/drawing/2014/main" id="{DD652B41-DB2B-8457-517B-809649E2BC49}"/>
               </a:ext>
             </a:extLst>
           </p:cNvPr>
@@ -8840,7 +11173,7 @@
                 <a:latin typeface="Arial"/>
                 <a:cs typeface="Arial"/>
               </a:rPr>
-              <a:t> Projected Benefits</a:t>
+              <a:t>Security Measures</a:t>
             </a:r>
             <a:endParaRPr lang="en-US" dirty="0"/>
           </a:p>
@@ -8857,7 +11190,7 @@
           <p:cNvPr id="3" name="Content Placeholder 2">
             <a:extLst>
               <a:ext uri="{FF2B5EF4-FFF2-40B4-BE49-F238E27FC236}">
-                <a16:creationId xmlns:a16="http://schemas.microsoft.com/office/drawing/2014/main" id="{FE289D20-E233-DFCF-5E5B-05F88CC0AE53}"/>
+                <a16:creationId xmlns:a16="http://schemas.microsoft.com/office/drawing/2014/main" id="{12BBF245-F833-E55D-CF79-B7D67EB699B0}"/>
               </a:ext>
             </a:extLst>
           </p:cNvPr>
@@ -8870,45 +11203,97 @@
         </p:nvSpPr>
         <p:spPr>
           <a:xfrm>
-            <a:off x="4252749" y="355086"/>
-            <a:ext cx="6801548" cy="6213141"/>
+            <a:off x="4137220" y="659535"/>
+            <a:ext cx="7051919" cy="6507055"/>
           </a:xfrm>
         </p:spPr>
         <p:txBody>
           <a:bodyPr vert="horz" lIns="91440" tIns="45720" rIns="91440" bIns="45720" rtlCol="0">
-            <a:normAutofit/>
+            <a:normAutofit lnSpcReduction="10000"/>
           </a:bodyPr>
           <a:lstStyle/>
           <a:p>
             <a:r>
-              <a:rPr lang="en-US" sz="2800" dirty="0">
-                <a:ea typeface="+mn-lt"/>
-                <a:cs typeface="+mn-lt"/>
+              <a:rPr lang="en-US" sz="2400" dirty="0">
+                <a:latin typeface="Arial"/>
+                <a:cs typeface="Arial"/>
               </a:rPr>
-              <a:t>Implementing the Wheel Wise Insurance Management System offers clients numerous benefit:</a:t>
-            </a:r>
-            <a:endParaRPr lang="en-US" sz="2800"/>
+              <a:t>The Wheel Wise Insurance Management System employs security measures to protect data confidentiality, integrity, and availability. These include:</a:t>
+            </a:r>
+            <a:endParaRPr lang="en-US" sz="2400">
+              <a:latin typeface="Corbel" panose="020B0503020204020204"/>
+              <a:cs typeface="Calibri" panose="020F0502020204030204"/>
+            </a:endParaRPr>
           </a:p>
           <a:p>
             <a:pPr lvl="1" indent="0"/>
             <a:r>
-              <a:rPr lang="en-US" sz="2800" dirty="0">
-                <a:ea typeface="+mn-lt"/>
-                <a:cs typeface="+mn-lt"/>
+              <a:rPr lang="en-US" sz="2400" dirty="0">
+                <a:latin typeface="Arial"/>
+                <a:cs typeface="Arial"/>
               </a:rPr>
-              <a:t>Including increased efficiency through streamlined processes, </a:t>
-            </a:r>
+              <a:t> Data encryption for both in-transit and at-rest data, </a:t>
+            </a:r>
+            <a:endParaRPr lang="en-US" sz="2400">
+              <a:latin typeface="Corbel" panose="020B0503020204020204"/>
+              <a:cs typeface="Calibri" panose="020F0502020204030204"/>
+            </a:endParaRPr>
           </a:p>
           <a:p>
             <a:pPr lvl="1" indent="0"/>
             <a:r>
-              <a:rPr lang="en-US" sz="2800" dirty="0">
-                <a:ea typeface="+mn-lt"/>
-                <a:cs typeface="+mn-lt"/>
+              <a:rPr lang="en-US" sz="2400" dirty="0">
+                <a:latin typeface="Arial"/>
+                <a:cs typeface="Arial"/>
               </a:rPr>
-              <a:t>Enhanced customer satisfaction with seamless user experience, </a:t>
-            </a:r>
-            <a:endParaRPr lang="en-US" sz="2800"/>
+              <a:t> Authentication using secure login credentials, and </a:t>
+            </a:r>
+            <a:endParaRPr lang="en-US" sz="2400">
+              <a:latin typeface="Corbel" panose="020B0503020204020204"/>
+              <a:cs typeface="Calibri" panose="020F0502020204030204"/>
+            </a:endParaRPr>
+          </a:p>
+          <a:p>
+            <a:pPr lvl="1" indent="0"/>
+            <a:r>
+              <a:rPr lang="en-US" sz="2400" dirty="0">
+                <a:latin typeface="Arial"/>
+                <a:cs typeface="Arial"/>
+              </a:rPr>
+              <a:t> Role-based access control (RBAC) for authorization. </a:t>
+            </a:r>
+            <a:endParaRPr lang="en-US" sz="2400">
+              <a:latin typeface="Corbel" panose="020B0503020204020204"/>
+              <a:cs typeface="Calibri" panose="020F0502020204030204"/>
+            </a:endParaRPr>
+          </a:p>
+          <a:p>
+            <a:pPr lvl="1" indent="0"/>
+            <a:endParaRPr lang="en-US" sz="2400" dirty="0">
+              <a:latin typeface="Arial"/>
+              <a:cs typeface="Arial"/>
+            </a:endParaRPr>
+          </a:p>
+          <a:p>
+            <a:r>
+              <a:rPr lang="en-US" sz="2400" dirty="0">
+                <a:latin typeface="Arial"/>
+                <a:cs typeface="Arial"/>
+              </a:rPr>
+              <a:t>The system adheres to specific compliance requirements and secures sensitive information, such as customer details, policy data, and payment information, using encryption techniques and secure storage methods for passwords.</a:t>
+            </a:r>
+            <a:endParaRPr lang="en-US" sz="2400">
+              <a:cs typeface="Calibri" panose="020F0502020204030204"/>
+            </a:endParaRPr>
+          </a:p>
+          <a:p>
+            <a:pPr marL="0" indent="0">
+              <a:buNone/>
+            </a:pPr>
+            <a:br>
+              <a:rPr lang="en-US" dirty="0"/>
+            </a:br>
+            <a:endParaRPr lang="en-US"/>
           </a:p>
         </p:txBody>
       </p:sp>
@@ -9005,7 +11390,7 @@
     </p:spTree>
     <p:extLst>
       <p:ext uri="{BB962C8B-B14F-4D97-AF65-F5344CB8AC3E}">
-        <p14:creationId xmlns:p14="http://schemas.microsoft.com/office/powerpoint/2010/main" val="2554246962"/>
+        <p14:creationId xmlns:p14="http://schemas.microsoft.com/office/powerpoint/2010/main" val="3473985570"/>
       </p:ext>
     </p:extLst>
   </p:cSld>

</xml_diff>